<commit_message>
another pass over RAN
</commit_message>
<xml_diff>
--- a/figures/sdn/figures.pptx
+++ b/figures/sdn/figures.pptx
@@ -11369,7 +11369,7 @@
         </p:nvSpPr>
         <p:spPr>
           <a:xfrm>
-            <a:off x="4204556" y="5512273"/>
+            <a:off x="4204556" y="5923091"/>
             <a:ext cx="397866" cy="307777"/>
           </a:xfrm>
           <a:prstGeom prst="rect">
@@ -11404,7 +11404,7 @@
         </p:nvSpPr>
         <p:spPr>
           <a:xfrm>
-            <a:off x="3732123" y="5666161"/>
+            <a:off x="3732123" y="6076979"/>
             <a:ext cx="397866" cy="307777"/>
           </a:xfrm>
           <a:prstGeom prst="rect">
@@ -11439,7 +11439,7 @@
         </p:nvSpPr>
         <p:spPr>
           <a:xfrm>
-            <a:off x="7439145" y="5506894"/>
+            <a:off x="7439145" y="5917712"/>
             <a:ext cx="397866" cy="307777"/>
           </a:xfrm>
           <a:prstGeom prst="rect">
@@ -11474,7 +11474,7 @@
         </p:nvSpPr>
         <p:spPr>
           <a:xfrm>
-            <a:off x="7921902" y="5656987"/>
+            <a:off x="7921902" y="6067805"/>
             <a:ext cx="397866" cy="307777"/>
           </a:xfrm>
           <a:prstGeom prst="rect">
@@ -11509,7 +11509,7 @@
         </p:nvSpPr>
         <p:spPr>
           <a:xfrm>
-            <a:off x="3685374" y="3968282"/>
+            <a:off x="3685374" y="4379100"/>
             <a:ext cx="493876" cy="402772"/>
           </a:xfrm>
           <a:prstGeom prst="rect">
@@ -11566,7 +11566,7 @@
         </p:nvSpPr>
         <p:spPr>
           <a:xfrm>
-            <a:off x="7842040" y="3968282"/>
+            <a:off x="7842040" y="4379100"/>
             <a:ext cx="493876" cy="402772"/>
           </a:xfrm>
           <a:prstGeom prst="rect">
@@ -11626,7 +11626,7 @@
         </p:nvCxnSpPr>
         <p:spPr>
           <a:xfrm>
-            <a:off x="3932312" y="4371054"/>
+            <a:off x="3932312" y="4781872"/>
             <a:ext cx="471178" cy="381410"/>
           </a:xfrm>
           <a:prstGeom prst="line">
@@ -11672,7 +11672,7 @@
         </p:nvCxnSpPr>
         <p:spPr>
           <a:xfrm flipH="1">
-            <a:off x="3931057" y="4371054"/>
+            <a:off x="3931057" y="4781872"/>
             <a:ext cx="1255" cy="587003"/>
           </a:xfrm>
           <a:prstGeom prst="line">
@@ -11718,7 +11718,7 @@
         </p:nvCxnSpPr>
         <p:spPr>
           <a:xfrm>
-            <a:off x="8088978" y="4371054"/>
+            <a:off x="8088978" y="4781872"/>
             <a:ext cx="21930" cy="587003"/>
           </a:xfrm>
           <a:prstGeom prst="line">
@@ -11764,7 +11764,7 @@
         </p:nvCxnSpPr>
         <p:spPr>
           <a:xfrm flipH="1">
-            <a:off x="7640791" y="4371054"/>
+            <a:off x="7640791" y="4781872"/>
             <a:ext cx="448187" cy="381410"/>
           </a:xfrm>
           <a:prstGeom prst="line">
@@ -11807,7 +11807,7 @@
         </p:nvSpPr>
         <p:spPr>
           <a:xfrm>
-            <a:off x="5730214" y="2768565"/>
+            <a:off x="5730214" y="3179383"/>
             <a:ext cx="493876" cy="402772"/>
           </a:xfrm>
           <a:prstGeom prst="rect">
@@ -11867,7 +11867,7 @@
         </p:nvCxnSpPr>
         <p:spPr>
           <a:xfrm flipH="1">
-            <a:off x="3932312" y="3171337"/>
+            <a:off x="3932312" y="3582155"/>
             <a:ext cx="2044840" cy="796945"/>
           </a:xfrm>
           <a:prstGeom prst="line">
@@ -11913,7 +11913,7 @@
         </p:nvCxnSpPr>
         <p:spPr>
           <a:xfrm>
-            <a:off x="5977152" y="3171337"/>
+            <a:off x="5977152" y="3582155"/>
             <a:ext cx="2111826" cy="796945"/>
           </a:xfrm>
           <a:prstGeom prst="line">
@@ -11956,8 +11956,8 @@
         </p:nvSpPr>
         <p:spPr>
           <a:xfrm>
-            <a:off x="4630871" y="1941233"/>
-            <a:ext cx="2692561" cy="433339"/>
+            <a:off x="4630871" y="2076615"/>
+            <a:ext cx="2692561" cy="708775"/>
           </a:xfrm>
           <a:prstGeom prst="roundRect">
             <a:avLst/>
@@ -11993,7 +11993,7 @@
           <a:p>
             <a:pPr algn="ctr"/>
             <a:r>
-              <a:rPr lang="en-US" dirty="0"/>
+              <a:rPr lang="en-US" sz="2000" dirty="0"/>
               <a:t>RIC</a:t>
             </a:r>
           </a:p>
@@ -12017,7 +12017,7 @@
         </p:nvCxnSpPr>
         <p:spPr>
           <a:xfrm>
-            <a:off x="5977152" y="2374572"/>
+            <a:off x="5977152" y="2785390"/>
             <a:ext cx="2111826" cy="1593710"/>
           </a:xfrm>
           <a:prstGeom prst="straightConnector1">
@@ -12060,7 +12060,7 @@
         </p:nvCxnSpPr>
         <p:spPr>
           <a:xfrm>
-            <a:off x="5977152" y="2374572"/>
+            <a:off x="5977152" y="2785390"/>
             <a:ext cx="1663639" cy="2377892"/>
           </a:xfrm>
           <a:prstGeom prst="straightConnector1">
@@ -12103,7 +12103,7 @@
         </p:nvCxnSpPr>
         <p:spPr>
           <a:xfrm>
-            <a:off x="5977152" y="2374572"/>
+            <a:off x="5977152" y="2785390"/>
             <a:ext cx="2133756" cy="2583485"/>
           </a:xfrm>
           <a:prstGeom prst="straightConnector1">
@@ -12146,7 +12146,7 @@
         </p:nvCxnSpPr>
         <p:spPr>
           <a:xfrm flipH="1">
-            <a:off x="4403490" y="2374572"/>
+            <a:off x="4403490" y="2785390"/>
             <a:ext cx="1573662" cy="2377892"/>
           </a:xfrm>
           <a:prstGeom prst="straightConnector1">
@@ -12190,7 +12190,7 @@
         </p:nvCxnSpPr>
         <p:spPr>
           <a:xfrm flipH="1">
-            <a:off x="3932312" y="2374572"/>
+            <a:off x="3932312" y="2785390"/>
             <a:ext cx="2044840" cy="1593710"/>
           </a:xfrm>
           <a:prstGeom prst="straightConnector1">
@@ -12233,7 +12233,7 @@
         </p:nvCxnSpPr>
         <p:spPr>
           <a:xfrm flipH="1">
-            <a:off x="3931057" y="2374572"/>
+            <a:off x="3931057" y="2785390"/>
             <a:ext cx="2046095" cy="2583485"/>
           </a:xfrm>
           <a:prstGeom prst="straightConnector1">
@@ -12287,7 +12287,7 @@
         </p:blipFill>
         <p:spPr>
           <a:xfrm>
-            <a:off x="7868701" y="4961530"/>
+            <a:off x="7868701" y="5372348"/>
             <a:ext cx="506243" cy="704629"/>
           </a:xfrm>
           <a:prstGeom prst="rect">
@@ -12323,7 +12323,7 @@
         </p:blipFill>
         <p:spPr>
           <a:xfrm>
-            <a:off x="7384956" y="4792240"/>
+            <a:off x="7384956" y="5203058"/>
             <a:ext cx="506243" cy="704629"/>
           </a:xfrm>
           <a:prstGeom prst="rect">
@@ -12359,7 +12359,7 @@
         </p:blipFill>
         <p:spPr>
           <a:xfrm>
-            <a:off x="4153066" y="4814809"/>
+            <a:off x="4153066" y="5225627"/>
             <a:ext cx="506243" cy="704629"/>
           </a:xfrm>
           <a:prstGeom prst="rect">
@@ -12395,7 +12395,7 @@
         </p:blipFill>
         <p:spPr>
           <a:xfrm>
-            <a:off x="3674494" y="4961531"/>
+            <a:off x="3674494" y="5372349"/>
             <a:ext cx="506243" cy="704629"/>
           </a:xfrm>
           <a:prstGeom prst="rect">
@@ -12417,7 +12417,7 @@
         </p:nvSpPr>
         <p:spPr>
           <a:xfrm rot="5400000">
-            <a:off x="4051198" y="826593"/>
+            <a:off x="4051198" y="985620"/>
             <a:ext cx="1608322" cy="448977"/>
           </a:xfrm>
           <a:prstGeom prst="roundRect">
@@ -12476,7 +12476,7 @@
         </p:nvSpPr>
         <p:spPr>
           <a:xfrm rot="5400000">
-            <a:off x="5299145" y="826593"/>
+            <a:off x="5299145" y="985620"/>
             <a:ext cx="1608322" cy="448977"/>
           </a:xfrm>
           <a:prstGeom prst="roundRect">
@@ -12535,7 +12535,7 @@
         </p:nvSpPr>
         <p:spPr>
           <a:xfrm rot="5400000">
-            <a:off x="4694640" y="826593"/>
+            <a:off x="4694640" y="985620"/>
             <a:ext cx="1608322" cy="448977"/>
           </a:xfrm>
           <a:prstGeom prst="roundRect">
@@ -12594,7 +12594,7 @@
         </p:nvSpPr>
         <p:spPr>
           <a:xfrm rot="5400000">
-            <a:off x="5909474" y="826593"/>
+            <a:off x="5909474" y="985620"/>
             <a:ext cx="1608322" cy="448977"/>
           </a:xfrm>
           <a:prstGeom prst="roundRect">
@@ -12653,7 +12653,7 @@
         </p:nvSpPr>
         <p:spPr>
           <a:xfrm>
-            <a:off x="6980068" y="959802"/>
+            <a:off x="6980068" y="1118829"/>
             <a:ext cx="343364" cy="369332"/>
           </a:xfrm>
           <a:prstGeom prst="rect">
@@ -12693,7 +12693,7 @@
         </p:nvCxnSpPr>
         <p:spPr>
           <a:xfrm>
-            <a:off x="5977152" y="2374572"/>
+            <a:off x="5977152" y="2785390"/>
             <a:ext cx="0" cy="393993"/>
           </a:xfrm>
           <a:prstGeom prst="straightConnector1">
@@ -12719,6 +12719,109 @@
           </a:fontRef>
         </p:style>
       </p:cxnSp>
+      <p:sp>
+        <p:nvSpPr>
+          <p:cNvPr id="41" name="TextBox 40">
+            <a:extLst>
+              <a:ext uri="{FF2B5EF4-FFF2-40B4-BE49-F238E27FC236}">
+                <a16:creationId xmlns:a16="http://schemas.microsoft.com/office/drawing/2014/main" id="{7D4B7316-A137-3DE0-16B1-981D9C514631}"/>
+              </a:ext>
+            </a:extLst>
+          </p:cNvPr>
+          <p:cNvSpPr txBox="1"/>
+          <p:nvPr/>
+        </p:nvSpPr>
+        <p:spPr>
+          <a:xfrm>
+            <a:off x="3489335" y="980329"/>
+            <a:ext cx="977191" cy="646331"/>
+          </a:xfrm>
+          <a:prstGeom prst="rect">
+            <a:avLst/>
+          </a:prstGeom>
+          <a:noFill/>
+        </p:spPr>
+        <p:txBody>
+          <a:bodyPr wrap="none" rtlCol="0">
+            <a:spAutoFit/>
+          </a:bodyPr>
+          <a:lstStyle/>
+          <a:p>
+            <a:pPr algn="r"/>
+            <a:r>
+              <a:rPr lang="en-US" dirty="0"/>
+              <a:t>Example</a:t>
+            </a:r>
+          </a:p>
+          <a:p>
+            <a:pPr algn="r"/>
+            <a:r>
+              <a:rPr lang="en-US" dirty="0" err="1"/>
+              <a:t>xApps</a:t>
+            </a:r>
+            <a:endParaRPr lang="en-US" dirty="0"/>
+          </a:p>
+        </p:txBody>
+      </p:sp>
+      <p:sp>
+        <p:nvSpPr>
+          <p:cNvPr id="49" name="Can 48">
+            <a:extLst>
+              <a:ext uri="{FF2B5EF4-FFF2-40B4-BE49-F238E27FC236}">
+                <a16:creationId xmlns:a16="http://schemas.microsoft.com/office/drawing/2014/main" id="{9521086D-2113-30C3-4D96-7E36D2AF5CA5}"/>
+              </a:ext>
+            </a:extLst>
+          </p:cNvPr>
+          <p:cNvSpPr/>
+          <p:nvPr/>
+        </p:nvSpPr>
+        <p:spPr>
+          <a:xfrm>
+            <a:off x="6468320" y="2183514"/>
+            <a:ext cx="675861" cy="503582"/>
+          </a:xfrm>
+          <a:prstGeom prst="can">
+            <a:avLst/>
+          </a:prstGeom>
+          <a:solidFill>
+            <a:schemeClr val="accent1">
+              <a:lumMod val="60000"/>
+              <a:lumOff val="40000"/>
+            </a:schemeClr>
+          </a:solidFill>
+        </p:spPr>
+        <p:style>
+          <a:lnRef idx="2">
+            <a:schemeClr val="accent1">
+              <a:shade val="50000"/>
+            </a:schemeClr>
+          </a:lnRef>
+          <a:fillRef idx="1">
+            <a:schemeClr val="accent1"/>
+          </a:fillRef>
+          <a:effectRef idx="0">
+            <a:schemeClr val="accent1"/>
+          </a:effectRef>
+          <a:fontRef idx="minor">
+            <a:schemeClr val="lt1"/>
+          </a:fontRef>
+        </p:style>
+        <p:txBody>
+          <a:bodyPr rtlCol="0" anchor="ctr"/>
+          <a:lstStyle/>
+          <a:p>
+            <a:pPr algn="ctr"/>
+            <a:r>
+              <a:rPr lang="en-US" sz="1600" dirty="0">
+                <a:solidFill>
+                  <a:schemeClr val="tx1"/>
+                </a:solidFill>
+              </a:rPr>
+              <a:t>R-NIB</a:t>
+            </a:r>
+          </a:p>
+        </p:txBody>
+      </p:sp>
     </p:spTree>
     <p:extLst>
       <p:ext uri="{BB962C8B-B14F-4D97-AF65-F5344CB8AC3E}">
@@ -12946,12 +13049,12 @@
               <a:buNone/>
             </a:pPr>
             <a:r>
-              <a:rPr lang="en" dirty="0">
+              <a:rPr lang="en">
                 <a:solidFill>
                   <a:schemeClr val="bg1"/>
                 </a:solidFill>
               </a:rPr>
-              <a:t>Control</a:t>
+              <a:t>Device</a:t>
             </a:r>
             <a:endParaRPr dirty="0">
               <a:solidFill>

</xml_diff>

<commit_message>
first pass over Magma
</commit_message>
<xml_diff>
--- a/figures/sdn/figures.pptx
+++ b/figures/sdn/figures.pptx
@@ -207,7 +207,7 @@
           <a:p>
             <a:fld id="{CD99FC43-7065-F348-8836-4FD247176936}" type="datetimeFigureOut">
               <a:rPr lang="en-US" smtClean="0"/>
-              <a:t>12/16/22</a:t>
+              <a:t>1/6/23</a:t>
             </a:fld>
             <a:endParaRPr lang="en-US" dirty="0"/>
           </a:p>
@@ -754,7 +754,7 @@
           <a:p>
             <a:fld id="{5D97E163-DB95-D24D-8C95-263DECB1FC34}" type="datetimeFigureOut">
               <a:rPr lang="en-US" smtClean="0"/>
-              <a:t>12/16/22</a:t>
+              <a:t>1/6/23</a:t>
             </a:fld>
             <a:endParaRPr lang="en-US" dirty="0"/>
           </a:p>
@@ -922,7 +922,7 @@
           <a:p>
             <a:fld id="{5D97E163-DB95-D24D-8C95-263DECB1FC34}" type="datetimeFigureOut">
               <a:rPr lang="en-US" smtClean="0"/>
-              <a:t>12/16/22</a:t>
+              <a:t>1/6/23</a:t>
             </a:fld>
             <a:endParaRPr lang="en-US" dirty="0"/>
           </a:p>
@@ -1100,7 +1100,7 @@
           <a:p>
             <a:fld id="{5D97E163-DB95-D24D-8C95-263DECB1FC34}" type="datetimeFigureOut">
               <a:rPr lang="en-US" smtClean="0"/>
-              <a:t>12/16/22</a:t>
+              <a:t>1/6/23</a:t>
             </a:fld>
             <a:endParaRPr lang="en-US" dirty="0"/>
           </a:p>
@@ -1268,7 +1268,7 @@
           <a:p>
             <a:fld id="{5D97E163-DB95-D24D-8C95-263DECB1FC34}" type="datetimeFigureOut">
               <a:rPr lang="en-US" smtClean="0"/>
-              <a:t>12/16/22</a:t>
+              <a:t>1/6/23</a:t>
             </a:fld>
             <a:endParaRPr lang="en-US" dirty="0"/>
           </a:p>
@@ -1513,7 +1513,7 @@
           <a:p>
             <a:fld id="{5D97E163-DB95-D24D-8C95-263DECB1FC34}" type="datetimeFigureOut">
               <a:rPr lang="en-US" smtClean="0"/>
-              <a:t>12/16/22</a:t>
+              <a:t>1/6/23</a:t>
             </a:fld>
             <a:endParaRPr lang="en-US" dirty="0"/>
           </a:p>
@@ -1742,7 +1742,7 @@
           <a:p>
             <a:fld id="{5D97E163-DB95-D24D-8C95-263DECB1FC34}" type="datetimeFigureOut">
               <a:rPr lang="en-US" smtClean="0"/>
-              <a:t>12/16/22</a:t>
+              <a:t>1/6/23</a:t>
             </a:fld>
             <a:endParaRPr lang="en-US" dirty="0"/>
           </a:p>
@@ -2106,7 +2106,7 @@
           <a:p>
             <a:fld id="{5D97E163-DB95-D24D-8C95-263DECB1FC34}" type="datetimeFigureOut">
               <a:rPr lang="en-US" smtClean="0"/>
-              <a:t>12/16/22</a:t>
+              <a:t>1/6/23</a:t>
             </a:fld>
             <a:endParaRPr lang="en-US" dirty="0"/>
           </a:p>
@@ -2223,7 +2223,7 @@
           <a:p>
             <a:fld id="{5D97E163-DB95-D24D-8C95-263DECB1FC34}" type="datetimeFigureOut">
               <a:rPr lang="en-US" smtClean="0"/>
-              <a:t>12/16/22</a:t>
+              <a:t>1/6/23</a:t>
             </a:fld>
             <a:endParaRPr lang="en-US" dirty="0"/>
           </a:p>
@@ -2318,7 +2318,7 @@
           <a:p>
             <a:fld id="{5D97E163-DB95-D24D-8C95-263DECB1FC34}" type="datetimeFigureOut">
               <a:rPr lang="en-US" smtClean="0"/>
-              <a:t>12/16/22</a:t>
+              <a:t>1/6/23</a:t>
             </a:fld>
             <a:endParaRPr lang="en-US" dirty="0"/>
           </a:p>
@@ -2593,7 +2593,7 @@
           <a:p>
             <a:fld id="{5D97E163-DB95-D24D-8C95-263DECB1FC34}" type="datetimeFigureOut">
               <a:rPr lang="en-US" smtClean="0"/>
-              <a:t>12/16/22</a:t>
+              <a:t>1/6/23</a:t>
             </a:fld>
             <a:endParaRPr lang="en-US" dirty="0"/>
           </a:p>
@@ -2848,7 +2848,7 @@
           <a:p>
             <a:fld id="{5D97E163-DB95-D24D-8C95-263DECB1FC34}" type="datetimeFigureOut">
               <a:rPr lang="en-US" smtClean="0"/>
-              <a:t>12/16/22</a:t>
+              <a:t>1/6/23</a:t>
             </a:fld>
             <a:endParaRPr lang="en-US" dirty="0"/>
           </a:p>
@@ -3059,7 +3059,7 @@
           <a:p>
             <a:fld id="{5D97E163-DB95-D24D-8C95-263DECB1FC34}" type="datetimeFigureOut">
               <a:rPr lang="en-US" smtClean="0"/>
-              <a:t>12/16/22</a:t>
+              <a:t>1/6/23</a:t>
             </a:fld>
             <a:endParaRPr lang="en-US" dirty="0"/>
           </a:p>
@@ -6860,10 +6860,10 @@
       </p:grpSpPr>
       <p:sp>
         <p:nvSpPr>
-          <p:cNvPr id="3" name="Rectangle 2">
-            <a:extLst>
-              <a:ext uri="{FF2B5EF4-FFF2-40B4-BE49-F238E27FC236}">
-                <a16:creationId xmlns:a16="http://schemas.microsoft.com/office/drawing/2014/main" id="{194AFD85-7F4E-9D4E-874C-3ED4EBFB2591}"/>
+          <p:cNvPr id="8" name="Rectangle 7">
+            <a:extLst>
+              <a:ext uri="{FF2B5EF4-FFF2-40B4-BE49-F238E27FC236}">
+                <a16:creationId xmlns:a16="http://schemas.microsoft.com/office/drawing/2014/main" id="{4F1C5037-F04A-804B-911A-BE545C8260CA}"/>
               </a:ext>
             </a:extLst>
           </p:cNvPr>
@@ -6872,18 +6872,22 @@
         </p:nvSpPr>
         <p:spPr>
           <a:xfrm>
-            <a:off x="6037383" y="1462084"/>
-            <a:ext cx="5591909" cy="3332654"/>
+            <a:off x="211017" y="1755824"/>
+            <a:ext cx="4982308" cy="2540734"/>
           </a:xfrm>
           <a:prstGeom prst="rect">
             <a:avLst/>
           </a:prstGeom>
           <a:solidFill>
-            <a:schemeClr val="bg1"/>
+            <a:schemeClr val="bg1">
+              <a:lumMod val="95000"/>
+            </a:schemeClr>
           </a:solidFill>
-          <a:ln w="12700" cap="flat">
+          <a:ln w="28575" cap="flat">
             <a:solidFill>
-              <a:schemeClr val="tx1"/>
+              <a:schemeClr val="bg1">
+                <a:lumMod val="75000"/>
+              </a:schemeClr>
             </a:solidFill>
             <a:miter lim="400000"/>
           </a:ln>
@@ -6963,10 +6967,10 @@
       </p:sp>
       <p:sp>
         <p:nvSpPr>
-          <p:cNvPr id="10" name="Rounded Rectangle 9">
-            <a:extLst>
-              <a:ext uri="{FF2B5EF4-FFF2-40B4-BE49-F238E27FC236}">
-                <a16:creationId xmlns:a16="http://schemas.microsoft.com/office/drawing/2014/main" id="{EC2607FB-0264-7F43-A778-A7391D6F4B56}"/>
+          <p:cNvPr id="3" name="Rectangle 2">
+            <a:extLst>
+              <a:ext uri="{FF2B5EF4-FFF2-40B4-BE49-F238E27FC236}">
+                <a16:creationId xmlns:a16="http://schemas.microsoft.com/office/drawing/2014/main" id="{194AFD85-7F4E-9D4E-874C-3ED4EBFB2591}"/>
               </a:ext>
             </a:extLst>
           </p:cNvPr>
@@ -6975,1850 +6979,23 @@
         </p:nvSpPr>
         <p:spPr>
           <a:xfrm>
-            <a:off x="7283709" y="376046"/>
-            <a:ext cx="3115340" cy="601583"/>
-          </a:xfrm>
-          <a:prstGeom prst="roundRect">
+            <a:off x="5896707" y="1462084"/>
+            <a:ext cx="5591909" cy="3332654"/>
+          </a:xfrm>
+          <a:prstGeom prst="rect">
             <a:avLst/>
           </a:prstGeom>
           <a:solidFill>
-            <a:srgbClr val="5B9BD5"/>
+            <a:schemeClr val="bg1">
+              <a:lumMod val="95000"/>
+            </a:schemeClr>
           </a:solidFill>
-          <a:ln w="12700" cap="flat">
+          <a:ln w="28575" cap="flat">
             <a:solidFill>
-              <a:schemeClr val="tx1">
-                <a:lumMod val="50000"/>
-                <a:lumOff val="50000"/>
+              <a:schemeClr val="bg1">
+                <a:lumMod val="75000"/>
               </a:schemeClr>
             </a:solidFill>
-            <a:miter lim="400000"/>
-          </a:ln>
-          <a:effectLst/>
-          <a:sp3d/>
-        </p:spPr>
-        <p:style>
-          <a:lnRef idx="0">
-            <a:scrgbClr r="0" g="0" b="0"/>
-          </a:lnRef>
-          <a:fillRef idx="0">
-            <a:scrgbClr r="0" g="0" b="0"/>
-          </a:fillRef>
-          <a:effectRef idx="0">
-            <a:scrgbClr r="0" g="0" b="0"/>
-          </a:effectRef>
-          <a:fontRef idx="none"/>
-        </p:style>
-        <p:txBody>
-          <a:bodyPr rot="0" spcFirstLastPara="1" vertOverflow="overflow" horzOverflow="overflow" vert="horz" wrap="square" lIns="25400" tIns="25400" rIns="25400" bIns="25400" numCol="1" spcCol="38100" rtlCol="0" anchor="ctr">
-            <a:spAutoFit/>
-          </a:bodyPr>
-          <a:lstStyle/>
-          <a:p>
-            <a:pPr algn="ctr" defTabSz="412750" hangingPunct="0"/>
-            <a:r>
-              <a:rPr lang="en-AU" sz="1600" kern="0" dirty="0">
-                <a:latin typeface="Arial" panose="020B0604020202020204"/>
-                <a:ea typeface="Palatino"/>
-                <a:sym typeface="Palatino"/>
-              </a:rPr>
-              <a:t>Central Control &amp; Management</a:t>
-            </a:r>
-          </a:p>
-          <a:p>
-            <a:pPr algn="ctr" defTabSz="412750" hangingPunct="0"/>
-            <a:r>
-              <a:rPr lang="en-AU" sz="1600" kern="0" dirty="0">
-                <a:latin typeface="Arial" panose="020B0604020202020204"/>
-                <a:ea typeface="Palatino"/>
-                <a:sym typeface="Palatino"/>
-              </a:rPr>
-              <a:t>(Orchestrator)</a:t>
-            </a:r>
-          </a:p>
-        </p:txBody>
-      </p:sp>
-      <p:sp>
-        <p:nvSpPr>
-          <p:cNvPr id="57" name="Rounded Rectangle 56">
-            <a:extLst>
-              <a:ext uri="{FF2B5EF4-FFF2-40B4-BE49-F238E27FC236}">
-                <a16:creationId xmlns:a16="http://schemas.microsoft.com/office/drawing/2014/main" id="{862A3C49-A572-2945-86B7-DC12A4FD8216}"/>
-              </a:ext>
-            </a:extLst>
-          </p:cNvPr>
-          <p:cNvSpPr/>
-          <p:nvPr/>
-        </p:nvSpPr>
-        <p:spPr>
-          <a:xfrm>
-            <a:off x="6220294" y="1627204"/>
-            <a:ext cx="2421747" cy="601583"/>
-          </a:xfrm>
-          <a:prstGeom prst="roundRect">
-            <a:avLst/>
-          </a:prstGeom>
-          <a:solidFill>
-            <a:srgbClr val="CFE7F1"/>
-          </a:solidFill>
-          <a:ln w="12700" cap="flat">
-            <a:solidFill>
-              <a:schemeClr val="tx1">
-                <a:lumMod val="50000"/>
-                <a:lumOff val="50000"/>
-              </a:schemeClr>
-            </a:solidFill>
-            <a:miter lim="400000"/>
-          </a:ln>
-          <a:effectLst/>
-          <a:sp3d/>
-        </p:spPr>
-        <p:style>
-          <a:lnRef idx="0">
-            <a:scrgbClr r="0" g="0" b="0"/>
-          </a:lnRef>
-          <a:fillRef idx="0">
-            <a:scrgbClr r="0" g="0" b="0"/>
-          </a:fillRef>
-          <a:effectRef idx="0">
-            <a:scrgbClr r="0" g="0" b="0"/>
-          </a:effectRef>
-          <a:fontRef idx="none"/>
-        </p:style>
-        <p:txBody>
-          <a:bodyPr rot="0" spcFirstLastPara="1" vertOverflow="overflow" horzOverflow="overflow" vert="horz" wrap="square" lIns="25400" tIns="25400" rIns="25400" bIns="25400" numCol="1" spcCol="38100" rtlCol="0" anchor="ctr">
-            <a:spAutoFit/>
-          </a:bodyPr>
-          <a:lstStyle/>
-          <a:p>
-            <a:pPr algn="ctr" defTabSz="412750" hangingPunct="0"/>
-            <a:r>
-              <a:rPr lang="en-AU" sz="1600" kern="0" dirty="0">
-                <a:latin typeface="Arial" panose="020B0604020202020204"/>
-                <a:ea typeface="Palatino"/>
-                <a:sym typeface="Palatino"/>
-              </a:rPr>
-              <a:t>Access Control &amp;</a:t>
-            </a:r>
-            <a:br>
-              <a:rPr lang="en-AU" sz="1600" kern="0" dirty="0">
-                <a:latin typeface="Arial" panose="020B0604020202020204"/>
-                <a:ea typeface="Palatino"/>
-                <a:sym typeface="Palatino"/>
-              </a:rPr>
-            </a:br>
-            <a:r>
-              <a:rPr lang="en-AU" sz="1600" kern="0" dirty="0">
-                <a:latin typeface="Arial" panose="020B0604020202020204"/>
-                <a:ea typeface="Palatino"/>
-                <a:sym typeface="Palatino"/>
-              </a:rPr>
-              <a:t>Management</a:t>
-            </a:r>
-          </a:p>
-        </p:txBody>
-      </p:sp>
-      <p:sp>
-        <p:nvSpPr>
-          <p:cNvPr id="22" name="Rounded Rectangle 21">
-            <a:extLst>
-              <a:ext uri="{FF2B5EF4-FFF2-40B4-BE49-F238E27FC236}">
-                <a16:creationId xmlns:a16="http://schemas.microsoft.com/office/drawing/2014/main" id="{56ACEF58-7B64-124A-87D9-832F33331CC8}"/>
-              </a:ext>
-            </a:extLst>
-          </p:cNvPr>
-          <p:cNvSpPr/>
-          <p:nvPr/>
-        </p:nvSpPr>
-        <p:spPr>
-          <a:xfrm>
-            <a:off x="6220294" y="2428169"/>
-            <a:ext cx="2421747" cy="601583"/>
-          </a:xfrm>
-          <a:prstGeom prst="roundRect">
-            <a:avLst/>
-          </a:prstGeom>
-          <a:solidFill>
-            <a:srgbClr val="CFE7F1"/>
-          </a:solidFill>
-          <a:ln w="12700" cap="flat">
-            <a:solidFill>
-              <a:schemeClr val="tx1">
-                <a:lumMod val="50000"/>
-                <a:lumOff val="50000"/>
-              </a:schemeClr>
-            </a:solidFill>
-            <a:miter lim="400000"/>
-          </a:ln>
-          <a:effectLst/>
-          <a:sp3d/>
-        </p:spPr>
-        <p:style>
-          <a:lnRef idx="0">
-            <a:scrgbClr r="0" g="0" b="0"/>
-          </a:lnRef>
-          <a:fillRef idx="0">
-            <a:scrgbClr r="0" g="0" b="0"/>
-          </a:fillRef>
-          <a:effectRef idx="0">
-            <a:scrgbClr r="0" g="0" b="0"/>
-          </a:effectRef>
-          <a:fontRef idx="none"/>
-        </p:style>
-        <p:txBody>
-          <a:bodyPr rot="0" spcFirstLastPara="1" vertOverflow="overflow" horzOverflow="overflow" vert="horz" wrap="square" lIns="25400" tIns="25400" rIns="25400" bIns="25400" numCol="1" spcCol="38100" rtlCol="0" anchor="ctr">
-            <a:spAutoFit/>
-          </a:bodyPr>
-          <a:lstStyle/>
-          <a:p>
-            <a:pPr algn="ctr" defTabSz="412750" hangingPunct="0"/>
-            <a:r>
-              <a:rPr lang="en-AU" sz="1600" kern="0" dirty="0">
-                <a:latin typeface="Arial" panose="020B0604020202020204"/>
-                <a:ea typeface="Palatino"/>
-                <a:sym typeface="Palatino"/>
-              </a:rPr>
-              <a:t>Subscriber </a:t>
-            </a:r>
-            <a:br>
-              <a:rPr lang="en-AU" sz="1600" kern="0" dirty="0">
-                <a:latin typeface="Arial" panose="020B0604020202020204"/>
-                <a:ea typeface="Palatino"/>
-                <a:sym typeface="Palatino"/>
-              </a:rPr>
-            </a:br>
-            <a:r>
-              <a:rPr lang="en-AU" sz="1600" kern="0" dirty="0">
-                <a:latin typeface="Arial" panose="020B0604020202020204"/>
-                <a:ea typeface="Palatino"/>
-                <a:sym typeface="Palatino"/>
-              </a:rPr>
-              <a:t>Management</a:t>
-            </a:r>
-          </a:p>
-        </p:txBody>
-      </p:sp>
-      <p:sp>
-        <p:nvSpPr>
-          <p:cNvPr id="16" name="Rounded Rectangle 15">
-            <a:extLst>
-              <a:ext uri="{FF2B5EF4-FFF2-40B4-BE49-F238E27FC236}">
-                <a16:creationId xmlns:a16="http://schemas.microsoft.com/office/drawing/2014/main" id="{2EA268C2-0DF4-3F4D-BFBE-8960BAA428C8}"/>
-              </a:ext>
-            </a:extLst>
-          </p:cNvPr>
-          <p:cNvSpPr/>
-          <p:nvPr/>
-        </p:nvSpPr>
-        <p:spPr>
-          <a:xfrm>
-            <a:off x="7667636" y="4296558"/>
-            <a:ext cx="2421747" cy="329168"/>
-          </a:xfrm>
-          <a:prstGeom prst="roundRect">
-            <a:avLst/>
-          </a:prstGeom>
-          <a:solidFill>
-            <a:schemeClr val="bg1">
-              <a:lumMod val="85000"/>
-            </a:schemeClr>
-          </a:solidFill>
-          <a:ln w="12700" cap="flat">
-            <a:solidFill>
-              <a:schemeClr val="tx1">
-                <a:lumMod val="50000"/>
-                <a:lumOff val="50000"/>
-              </a:schemeClr>
-            </a:solidFill>
-            <a:miter lim="400000"/>
-          </a:ln>
-          <a:effectLst/>
-          <a:sp3d/>
-        </p:spPr>
-        <p:style>
-          <a:lnRef idx="0">
-            <a:scrgbClr r="0" g="0" b="0"/>
-          </a:lnRef>
-          <a:fillRef idx="0">
-            <a:scrgbClr r="0" g="0" b="0"/>
-          </a:fillRef>
-          <a:effectRef idx="0">
-            <a:scrgbClr r="0" g="0" b="0"/>
-          </a:effectRef>
-          <a:fontRef idx="none"/>
-        </p:style>
-        <p:txBody>
-          <a:bodyPr rot="0" spcFirstLastPara="1" vertOverflow="overflow" horzOverflow="overflow" vert="horz" wrap="square" lIns="25400" tIns="25400" rIns="25400" bIns="25400" numCol="1" spcCol="38100" rtlCol="0" anchor="ctr">
-            <a:spAutoFit/>
-          </a:bodyPr>
-          <a:lstStyle/>
-          <a:p>
-            <a:pPr algn="ctr" defTabSz="412750" hangingPunct="0"/>
-            <a:r>
-              <a:rPr lang="en-AU" sz="1600" kern="0" dirty="0">
-                <a:latin typeface="Arial" panose="020B0604020202020204"/>
-                <a:ea typeface="Palatino"/>
-                <a:sym typeface="Palatino"/>
-              </a:rPr>
-              <a:t>Data Plane (OVS)</a:t>
-            </a:r>
-          </a:p>
-        </p:txBody>
-      </p:sp>
-      <p:sp>
-        <p:nvSpPr>
-          <p:cNvPr id="17" name="Rounded Rectangle 16">
-            <a:extLst>
-              <a:ext uri="{FF2B5EF4-FFF2-40B4-BE49-F238E27FC236}">
-                <a16:creationId xmlns:a16="http://schemas.microsoft.com/office/drawing/2014/main" id="{89496D19-A0DF-414C-BAB4-F6141CE2ABE5}"/>
-              </a:ext>
-            </a:extLst>
-          </p:cNvPr>
-          <p:cNvSpPr/>
-          <p:nvPr/>
-        </p:nvSpPr>
-        <p:spPr>
-          <a:xfrm>
-            <a:off x="9003371" y="1627204"/>
-            <a:ext cx="2387798" cy="601583"/>
-          </a:xfrm>
-          <a:prstGeom prst="roundRect">
-            <a:avLst/>
-          </a:prstGeom>
-          <a:solidFill>
-            <a:srgbClr val="CFE7F1"/>
-          </a:solidFill>
-          <a:ln w="12700" cap="flat">
-            <a:solidFill>
-              <a:schemeClr val="tx1">
-                <a:lumMod val="50000"/>
-                <a:lumOff val="50000"/>
-              </a:schemeClr>
-            </a:solidFill>
-            <a:miter lim="400000"/>
-          </a:ln>
-          <a:effectLst/>
-          <a:sp3d/>
-        </p:spPr>
-        <p:style>
-          <a:lnRef idx="0">
-            <a:scrgbClr r="0" g="0" b="0"/>
-          </a:lnRef>
-          <a:fillRef idx="0">
-            <a:scrgbClr r="0" g="0" b="0"/>
-          </a:fillRef>
-          <a:effectRef idx="0">
-            <a:scrgbClr r="0" g="0" b="0"/>
-          </a:effectRef>
-          <a:fontRef idx="none"/>
-        </p:style>
-        <p:txBody>
-          <a:bodyPr rot="0" spcFirstLastPara="1" vertOverflow="overflow" horzOverflow="overflow" vert="horz" wrap="square" lIns="25400" tIns="25400" rIns="25400" bIns="25400" numCol="1" spcCol="38100" rtlCol="0" anchor="ctr">
-            <a:spAutoFit/>
-          </a:bodyPr>
-          <a:lstStyle/>
-          <a:p>
-            <a:pPr algn="ctr" defTabSz="412750" hangingPunct="0"/>
-            <a:r>
-              <a:rPr lang="en-AU" sz="1600" kern="0" dirty="0">
-                <a:latin typeface="Arial" panose="020B0604020202020204"/>
-                <a:ea typeface="Palatino"/>
-                <a:sym typeface="Palatino"/>
-              </a:rPr>
-              <a:t>Device </a:t>
-            </a:r>
-            <a:br>
-              <a:rPr lang="en-AU" sz="1600" kern="0" dirty="0">
-                <a:latin typeface="Arial" panose="020B0604020202020204"/>
-                <a:ea typeface="Palatino"/>
-                <a:sym typeface="Palatino"/>
-              </a:rPr>
-            </a:br>
-            <a:r>
-              <a:rPr lang="en-AU" sz="1600" kern="0" dirty="0">
-                <a:latin typeface="Arial" panose="020B0604020202020204"/>
-                <a:ea typeface="Palatino"/>
-                <a:sym typeface="Palatino"/>
-              </a:rPr>
-              <a:t>Management</a:t>
-            </a:r>
-          </a:p>
-        </p:txBody>
-      </p:sp>
-      <p:sp>
-        <p:nvSpPr>
-          <p:cNvPr id="18" name="Rounded Rectangle 17">
-            <a:extLst>
-              <a:ext uri="{FF2B5EF4-FFF2-40B4-BE49-F238E27FC236}">
-                <a16:creationId xmlns:a16="http://schemas.microsoft.com/office/drawing/2014/main" id="{0FEE4C65-3823-4F47-A8D6-E44B0A2FFB28}"/>
-              </a:ext>
-            </a:extLst>
-          </p:cNvPr>
-          <p:cNvSpPr/>
-          <p:nvPr/>
-        </p:nvSpPr>
-        <p:spPr>
-          <a:xfrm>
-            <a:off x="9003370" y="2436145"/>
-            <a:ext cx="2387799" cy="601583"/>
-          </a:xfrm>
-          <a:prstGeom prst="roundRect">
-            <a:avLst/>
-          </a:prstGeom>
-          <a:solidFill>
-            <a:srgbClr val="CFE7F1"/>
-          </a:solidFill>
-          <a:ln w="12700" cap="flat">
-            <a:solidFill>
-              <a:schemeClr val="tx1">
-                <a:lumMod val="50000"/>
-                <a:lumOff val="50000"/>
-              </a:schemeClr>
-            </a:solidFill>
-            <a:miter lim="400000"/>
-          </a:ln>
-          <a:effectLst/>
-          <a:sp3d/>
-        </p:spPr>
-        <p:style>
-          <a:lnRef idx="0">
-            <a:scrgbClr r="0" g="0" b="0"/>
-          </a:lnRef>
-          <a:fillRef idx="0">
-            <a:scrgbClr r="0" g="0" b="0"/>
-          </a:fillRef>
-          <a:effectRef idx="0">
-            <a:scrgbClr r="0" g="0" b="0"/>
-          </a:effectRef>
-          <a:fontRef idx="none"/>
-        </p:style>
-        <p:txBody>
-          <a:bodyPr rot="0" spcFirstLastPara="1" vertOverflow="overflow" horzOverflow="overflow" vert="horz" wrap="square" lIns="25400" tIns="25400" rIns="25400" bIns="25400" numCol="1" spcCol="38100" rtlCol="0" anchor="ctr">
-            <a:spAutoFit/>
-          </a:bodyPr>
-          <a:lstStyle/>
-          <a:p>
-            <a:pPr algn="ctr" defTabSz="412750" hangingPunct="0"/>
-            <a:r>
-              <a:rPr lang="en-AU" sz="1600" kern="0" dirty="0">
-                <a:latin typeface="Arial" panose="020B0604020202020204"/>
-                <a:ea typeface="Palatino"/>
-                <a:sym typeface="Palatino"/>
-              </a:rPr>
-              <a:t>Session &amp; Policy</a:t>
-            </a:r>
-            <a:br>
-              <a:rPr lang="en-AU" sz="1600" kern="0" dirty="0">
-                <a:latin typeface="Arial" panose="020B0604020202020204"/>
-                <a:ea typeface="Palatino"/>
-                <a:sym typeface="Palatino"/>
-              </a:rPr>
-            </a:br>
-            <a:r>
-              <a:rPr lang="en-AU" sz="1600" kern="0" dirty="0">
-                <a:latin typeface="Arial" panose="020B0604020202020204"/>
-                <a:ea typeface="Palatino"/>
-                <a:sym typeface="Palatino"/>
-              </a:rPr>
-              <a:t>Management</a:t>
-            </a:r>
-          </a:p>
-        </p:txBody>
-      </p:sp>
-      <p:sp>
-        <p:nvSpPr>
-          <p:cNvPr id="19" name="Rounded Rectangle 18">
-            <a:extLst>
-              <a:ext uri="{FF2B5EF4-FFF2-40B4-BE49-F238E27FC236}">
-                <a16:creationId xmlns:a16="http://schemas.microsoft.com/office/drawing/2014/main" id="{42FEC876-51CD-C64E-9766-94B660098298}"/>
-              </a:ext>
-            </a:extLst>
-          </p:cNvPr>
-          <p:cNvSpPr/>
-          <p:nvPr/>
-        </p:nvSpPr>
-        <p:spPr>
-          <a:xfrm>
-            <a:off x="9015093" y="3233362"/>
-            <a:ext cx="2405728" cy="601583"/>
-          </a:xfrm>
-          <a:prstGeom prst="roundRect">
-            <a:avLst/>
-          </a:prstGeom>
-          <a:solidFill>
-            <a:srgbClr val="CFE7F1"/>
-          </a:solidFill>
-          <a:ln w="12700" cap="flat">
-            <a:solidFill>
-              <a:schemeClr val="tx1">
-                <a:lumMod val="50000"/>
-                <a:lumOff val="50000"/>
-              </a:schemeClr>
-            </a:solidFill>
-            <a:miter lim="400000"/>
-          </a:ln>
-          <a:effectLst/>
-          <a:sp3d/>
-        </p:spPr>
-        <p:style>
-          <a:lnRef idx="0">
-            <a:scrgbClr r="0" g="0" b="0"/>
-          </a:lnRef>
-          <a:fillRef idx="0">
-            <a:scrgbClr r="0" g="0" b="0"/>
-          </a:fillRef>
-          <a:effectRef idx="0">
-            <a:scrgbClr r="0" g="0" b="0"/>
-          </a:effectRef>
-          <a:fontRef idx="none"/>
-        </p:style>
-        <p:txBody>
-          <a:bodyPr rot="0" spcFirstLastPara="1" vertOverflow="overflow" horzOverflow="overflow" vert="horz" wrap="square" lIns="25400" tIns="25400" rIns="25400" bIns="25400" numCol="1" spcCol="38100" rtlCol="0" anchor="ctr">
-            <a:spAutoFit/>
-          </a:bodyPr>
-          <a:lstStyle/>
-          <a:p>
-            <a:pPr algn="ctr" defTabSz="412750" hangingPunct="0"/>
-            <a:r>
-              <a:rPr lang="en-AU" sz="1600" kern="0" dirty="0">
-                <a:latin typeface="Arial" panose="020B0604020202020204"/>
-                <a:ea typeface="Palatino"/>
-                <a:sym typeface="Palatino"/>
-              </a:rPr>
-              <a:t>Telemetry &amp; </a:t>
-            </a:r>
-            <a:br>
-              <a:rPr lang="en-AU" sz="1600" kern="0" dirty="0">
-                <a:latin typeface="Arial" panose="020B0604020202020204"/>
-                <a:ea typeface="Palatino"/>
-                <a:sym typeface="Palatino"/>
-              </a:rPr>
-            </a:br>
-            <a:r>
-              <a:rPr lang="en-AU" sz="1600" kern="0" dirty="0">
-                <a:latin typeface="Arial" panose="020B0604020202020204"/>
-                <a:ea typeface="Palatino"/>
-                <a:sym typeface="Palatino"/>
-              </a:rPr>
-              <a:t>Logging</a:t>
-            </a:r>
-          </a:p>
-        </p:txBody>
-      </p:sp>
-      <p:cxnSp>
-        <p:nvCxnSpPr>
-          <p:cNvPr id="4" name="Straight Arrow Connector 3">
-            <a:extLst>
-              <a:ext uri="{FF2B5EF4-FFF2-40B4-BE49-F238E27FC236}">
-                <a16:creationId xmlns:a16="http://schemas.microsoft.com/office/drawing/2014/main" id="{9F934019-4534-AE4F-983F-936A607ACE86}"/>
-              </a:ext>
-            </a:extLst>
-          </p:cNvPr>
-          <p:cNvCxnSpPr>
-            <a:cxnSpLocks/>
-            <a:stCxn id="10" idx="2"/>
-            <a:endCxn id="3" idx="0"/>
-          </p:cNvCxnSpPr>
-          <p:nvPr/>
-        </p:nvCxnSpPr>
-        <p:spPr>
-          <a:xfrm flipH="1">
-            <a:off x="8833338" y="977629"/>
-            <a:ext cx="8041" cy="484455"/>
-          </a:xfrm>
-          <a:prstGeom prst="straightConnector1">
-            <a:avLst/>
-          </a:prstGeom>
-          <a:noFill/>
-          <a:ln w="25400" cap="flat">
-            <a:solidFill>
-              <a:schemeClr val="tx1">
-                <a:lumMod val="50000"/>
-                <a:lumOff val="50000"/>
-              </a:schemeClr>
-            </a:solidFill>
-            <a:prstDash val="solid"/>
-            <a:miter lim="400000"/>
-            <a:headEnd type="triangle" w="med" len="med"/>
-            <a:tailEnd type="triangle" w="med" len="med"/>
-          </a:ln>
-          <a:effectLst/>
-          <a:sp3d/>
-        </p:spPr>
-        <p:style>
-          <a:lnRef idx="0">
-            <a:scrgbClr r="0" g="0" b="0"/>
-          </a:lnRef>
-          <a:fillRef idx="0">
-            <a:scrgbClr r="0" g="0" b="0"/>
-          </a:fillRef>
-          <a:effectRef idx="0">
-            <a:scrgbClr r="0" g="0" b="0"/>
-          </a:effectRef>
-          <a:fontRef idx="none"/>
-        </p:style>
-      </p:cxnSp>
-      <p:sp>
-        <p:nvSpPr>
-          <p:cNvPr id="58" name="Rounded Rectangle 57">
-            <a:extLst>
-              <a:ext uri="{FF2B5EF4-FFF2-40B4-BE49-F238E27FC236}">
-                <a16:creationId xmlns:a16="http://schemas.microsoft.com/office/drawing/2014/main" id="{71331B65-83C8-FD44-9A9F-2058EA9F5644}"/>
-              </a:ext>
-            </a:extLst>
-          </p:cNvPr>
-          <p:cNvSpPr/>
-          <p:nvPr/>
-        </p:nvSpPr>
-        <p:spPr>
-          <a:xfrm>
-            <a:off x="1691801" y="5574182"/>
-            <a:ext cx="1655134" cy="329168"/>
-          </a:xfrm>
-          <a:prstGeom prst="roundRect">
-            <a:avLst/>
-          </a:prstGeom>
-          <a:solidFill>
-            <a:srgbClr val="5B9BD5"/>
-          </a:solidFill>
-          <a:ln w="12700" cap="flat">
-            <a:noFill/>
-            <a:miter lim="400000"/>
-          </a:ln>
-          <a:effectLst/>
-          <a:sp3d/>
-        </p:spPr>
-        <p:style>
-          <a:lnRef idx="0">
-            <a:scrgbClr r="0" g="0" b="0"/>
-          </a:lnRef>
-          <a:fillRef idx="0">
-            <a:scrgbClr r="0" g="0" b="0"/>
-          </a:fillRef>
-          <a:effectRef idx="0">
-            <a:scrgbClr r="0" g="0" b="0"/>
-          </a:effectRef>
-          <a:fontRef idx="none"/>
-        </p:style>
-        <p:txBody>
-          <a:bodyPr rot="0" spcFirstLastPara="1" vertOverflow="overflow" horzOverflow="overflow" vert="horz" wrap="square" lIns="25400" tIns="25400" rIns="25400" bIns="25400" numCol="1" spcCol="38100" rtlCol="0" anchor="ctr">
-            <a:spAutoFit/>
-          </a:bodyPr>
-          <a:lstStyle/>
-          <a:p>
-            <a:pPr algn="ctr" defTabSz="412750" hangingPunct="0"/>
-            <a:r>
-              <a:rPr lang="en-AU" sz="1600" kern="0" dirty="0" err="1">
-                <a:solidFill>
-                  <a:prstClr val="white"/>
-                </a:solidFill>
-                <a:latin typeface="Arial" panose="020B0604020202020204"/>
-                <a:ea typeface="Palatino"/>
-                <a:sym typeface="Palatino"/>
-              </a:rPr>
-              <a:t>eNodeB</a:t>
-            </a:r>
-            <a:r>
-              <a:rPr lang="en-AU" sz="1600" kern="0" dirty="0">
-                <a:solidFill>
-                  <a:prstClr val="white"/>
-                </a:solidFill>
-                <a:latin typeface="Arial" panose="020B0604020202020204"/>
-                <a:ea typeface="Palatino"/>
-                <a:sym typeface="Palatino"/>
-              </a:rPr>
-              <a:t>/</a:t>
-            </a:r>
-            <a:r>
-              <a:rPr lang="en-AU" sz="1600" kern="0" dirty="0" err="1">
-                <a:solidFill>
-                  <a:prstClr val="white"/>
-                </a:solidFill>
-                <a:latin typeface="Arial" panose="020B0604020202020204"/>
-                <a:ea typeface="Palatino"/>
-                <a:sym typeface="Palatino"/>
-              </a:rPr>
-              <a:t>gNB</a:t>
-            </a:r>
-            <a:endParaRPr lang="en-AU" sz="1600" kern="0" dirty="0">
-              <a:solidFill>
-                <a:prstClr val="white"/>
-              </a:solidFill>
-              <a:latin typeface="Arial" panose="020B0604020202020204"/>
-              <a:ea typeface="Palatino"/>
-              <a:sym typeface="Palatino"/>
-            </a:endParaRPr>
-          </a:p>
-        </p:txBody>
-      </p:sp>
-      <p:cxnSp>
-        <p:nvCxnSpPr>
-          <p:cNvPr id="25" name="Straight Arrow Connector 24">
-            <a:extLst>
-              <a:ext uri="{FF2B5EF4-FFF2-40B4-BE49-F238E27FC236}">
-                <a16:creationId xmlns:a16="http://schemas.microsoft.com/office/drawing/2014/main" id="{4A339110-8DED-BB4B-AEF4-BFD598D13D45}"/>
-              </a:ext>
-            </a:extLst>
-          </p:cNvPr>
-          <p:cNvCxnSpPr>
-            <a:cxnSpLocks/>
-          </p:cNvCxnSpPr>
-          <p:nvPr/>
-        </p:nvCxnSpPr>
-        <p:spPr>
-          <a:xfrm>
-            <a:off x="2566260" y="4160350"/>
-            <a:ext cx="0" cy="1413832"/>
-          </a:xfrm>
-          <a:prstGeom prst="straightConnector1">
-            <a:avLst/>
-          </a:prstGeom>
-          <a:noFill/>
-          <a:ln w="25400" cap="flat">
-            <a:solidFill>
-              <a:schemeClr val="accent1"/>
-            </a:solidFill>
-            <a:prstDash val="solid"/>
-            <a:miter lim="400000"/>
-            <a:headEnd type="triangle" w="med" len="med"/>
-            <a:tailEnd type="triangle" w="med" len="med"/>
-          </a:ln>
-          <a:effectLst/>
-          <a:sp3d/>
-        </p:spPr>
-        <p:style>
-          <a:lnRef idx="0">
-            <a:scrgbClr r="0" g="0" b="0"/>
-          </a:lnRef>
-          <a:fillRef idx="0">
-            <a:scrgbClr r="0" g="0" b="0"/>
-          </a:fillRef>
-          <a:effectRef idx="0">
-            <a:scrgbClr r="0" g="0" b="0"/>
-          </a:effectRef>
-          <a:fontRef idx="none"/>
-        </p:style>
-      </p:cxnSp>
-      <p:sp>
-        <p:nvSpPr>
-          <p:cNvPr id="21" name="Rectangle 20">
-            <a:extLst>
-              <a:ext uri="{FF2B5EF4-FFF2-40B4-BE49-F238E27FC236}">
-                <a16:creationId xmlns:a16="http://schemas.microsoft.com/office/drawing/2014/main" id="{3381E0AD-EDDE-104C-BD59-0B127522766A}"/>
-              </a:ext>
-            </a:extLst>
-          </p:cNvPr>
-          <p:cNvSpPr/>
-          <p:nvPr/>
-        </p:nvSpPr>
-        <p:spPr>
-          <a:xfrm flipH="1">
-            <a:off x="453606" y="5161342"/>
-            <a:ext cx="3075040" cy="1506819"/>
-          </a:xfrm>
-          <a:prstGeom prst="rect">
-            <a:avLst/>
-          </a:prstGeom>
-          <a:noFill/>
-          <a:ln w="25400" cap="flat" cmpd="sng" algn="ctr">
-            <a:solidFill>
-              <a:srgbClr val="626262"/>
-            </a:solidFill>
-            <a:prstDash val="sysDot"/>
-          </a:ln>
-          <a:effectLst/>
-        </p:spPr>
-        <p:txBody>
-          <a:bodyPr rtlCol="0" anchor="b"/>
-          <a:lstStyle/>
-          <a:p>
-            <a:pPr marL="0" marR="0" lvl="0" indent="0" algn="r" defTabSz="457200" eaLnBrk="1" fontAlgn="auto" latinLnBrk="0" hangingPunct="1">
-              <a:lnSpc>
-                <a:spcPct val="100000"/>
-              </a:lnSpc>
-              <a:spcBef>
-                <a:spcPts val="0"/>
-              </a:spcBef>
-              <a:spcAft>
-                <a:spcPts val="0"/>
-              </a:spcAft>
-              <a:buClrTx/>
-              <a:buSzTx/>
-              <a:buFontTx/>
-              <a:buNone/>
-              <a:tabLst/>
-              <a:defRPr/>
-            </a:pPr>
-            <a:r>
-              <a:rPr kumimoji="0" lang="en-US" b="0" i="0" u="none" strike="noStrike" kern="1200" cap="none" spc="0" normalizeH="0" baseline="0" noProof="0" dirty="0">
-                <a:ln>
-                  <a:noFill/>
-                </a:ln>
-                <a:solidFill>
-                  <a:srgbClr val="626262">
-                    <a:lumMod val="50000"/>
-                  </a:srgbClr>
-                </a:solidFill>
-                <a:effectLst/>
-                <a:uLnTx/>
-                <a:uFillTx/>
-                <a:latin typeface="+mn-lt"/>
-                <a:ea typeface="+mn-ea"/>
-                <a:cs typeface="+mn-cs"/>
-              </a:rPr>
-              <a:t>Radio Access Network</a:t>
-            </a:r>
-          </a:p>
-        </p:txBody>
-      </p:sp>
-      <p:sp>
-        <p:nvSpPr>
-          <p:cNvPr id="20" name="Rounded Rectangle 19">
-            <a:extLst>
-              <a:ext uri="{FF2B5EF4-FFF2-40B4-BE49-F238E27FC236}">
-                <a16:creationId xmlns:a16="http://schemas.microsoft.com/office/drawing/2014/main" id="{6806371B-383C-7941-9C69-F848B32126A5}"/>
-              </a:ext>
-            </a:extLst>
-          </p:cNvPr>
-          <p:cNvSpPr/>
-          <p:nvPr/>
-        </p:nvSpPr>
-        <p:spPr>
-          <a:xfrm>
-            <a:off x="6236313" y="3284721"/>
-            <a:ext cx="2405728" cy="601583"/>
-          </a:xfrm>
-          <a:prstGeom prst="roundRect">
-            <a:avLst/>
-          </a:prstGeom>
-          <a:solidFill>
-            <a:srgbClr val="CFE7F1"/>
-          </a:solidFill>
-          <a:ln w="12700" cap="flat">
-            <a:solidFill>
-              <a:schemeClr val="tx1">
-                <a:lumMod val="50000"/>
-                <a:lumOff val="50000"/>
-              </a:schemeClr>
-            </a:solidFill>
-            <a:miter lim="400000"/>
-          </a:ln>
-          <a:effectLst/>
-          <a:sp3d/>
-        </p:spPr>
-        <p:style>
-          <a:lnRef idx="0">
-            <a:scrgbClr r="0" g="0" b="0"/>
-          </a:lnRef>
-          <a:fillRef idx="0">
-            <a:scrgbClr r="0" g="0" b="0"/>
-          </a:fillRef>
-          <a:effectRef idx="0">
-            <a:scrgbClr r="0" g="0" b="0"/>
-          </a:effectRef>
-          <a:fontRef idx="none"/>
-        </p:style>
-        <p:txBody>
-          <a:bodyPr rot="0" spcFirstLastPara="1" vertOverflow="overflow" horzOverflow="overflow" vert="horz" wrap="square" lIns="25400" tIns="25400" rIns="25400" bIns="25400" numCol="1" spcCol="38100" rtlCol="0" anchor="ctr">
-            <a:spAutoFit/>
-          </a:bodyPr>
-          <a:lstStyle/>
-          <a:p>
-            <a:pPr algn="ctr" defTabSz="412750" hangingPunct="0"/>
-            <a:r>
-              <a:rPr lang="en-AU" sz="1600" kern="0" dirty="0">
-                <a:latin typeface="Arial" panose="020B0604020202020204"/>
-                <a:ea typeface="Palatino"/>
-                <a:sym typeface="Palatino"/>
-              </a:rPr>
-              <a:t>Data Plane </a:t>
-            </a:r>
-            <a:br>
-              <a:rPr lang="en-AU" sz="1600" kern="0" dirty="0">
-                <a:latin typeface="Arial" panose="020B0604020202020204"/>
-                <a:ea typeface="Palatino"/>
-                <a:sym typeface="Palatino"/>
-              </a:rPr>
-            </a:br>
-            <a:r>
-              <a:rPr lang="en-AU" sz="1600" kern="0" dirty="0">
-                <a:latin typeface="Arial" panose="020B0604020202020204"/>
-                <a:ea typeface="Palatino"/>
-                <a:sym typeface="Palatino"/>
-              </a:rPr>
-              <a:t>Configuration</a:t>
-            </a:r>
-          </a:p>
-        </p:txBody>
-      </p:sp>
-      <p:sp>
-        <p:nvSpPr>
-          <p:cNvPr id="27" name="Rounded Rectangle 26">
-            <a:extLst>
-              <a:ext uri="{FF2B5EF4-FFF2-40B4-BE49-F238E27FC236}">
-                <a16:creationId xmlns:a16="http://schemas.microsoft.com/office/drawing/2014/main" id="{B6D2CA22-C153-4242-A3F3-6079321722AE}"/>
-              </a:ext>
-            </a:extLst>
-          </p:cNvPr>
-          <p:cNvSpPr/>
-          <p:nvPr/>
-        </p:nvSpPr>
-        <p:spPr>
-          <a:xfrm>
-            <a:off x="897344" y="3831182"/>
-            <a:ext cx="2405728" cy="329168"/>
-          </a:xfrm>
-          <a:prstGeom prst="roundRect">
-            <a:avLst/>
-          </a:prstGeom>
-          <a:solidFill>
-            <a:srgbClr val="CFE7F1"/>
-          </a:solidFill>
-          <a:ln w="12700" cap="flat">
-            <a:solidFill>
-              <a:schemeClr val="tx1">
-                <a:lumMod val="50000"/>
-                <a:lumOff val="50000"/>
-              </a:schemeClr>
-            </a:solidFill>
-            <a:miter lim="400000"/>
-          </a:ln>
-          <a:effectLst/>
-          <a:sp3d/>
-        </p:spPr>
-        <p:style>
-          <a:lnRef idx="0">
-            <a:scrgbClr r="0" g="0" b="0"/>
-          </a:lnRef>
-          <a:fillRef idx="0">
-            <a:scrgbClr r="0" g="0" b="0"/>
-          </a:fillRef>
-          <a:effectRef idx="0">
-            <a:scrgbClr r="0" g="0" b="0"/>
-          </a:effectRef>
-          <a:fontRef idx="none"/>
-        </p:style>
-        <p:txBody>
-          <a:bodyPr rot="0" spcFirstLastPara="1" vertOverflow="overflow" horzOverflow="overflow" vert="horz" wrap="square" lIns="25400" tIns="25400" rIns="25400" bIns="25400" numCol="1" spcCol="38100" rtlCol="0" anchor="ctr">
-            <a:spAutoFit/>
-          </a:bodyPr>
-          <a:lstStyle/>
-          <a:p>
-            <a:pPr algn="ctr" defTabSz="412750" hangingPunct="0"/>
-            <a:r>
-              <a:rPr lang="en-AU" sz="1600" kern="0" dirty="0">
-                <a:latin typeface="Arial" panose="020B0604020202020204"/>
-                <a:ea typeface="Palatino"/>
-                <a:sym typeface="Palatino"/>
-              </a:rPr>
-              <a:t>SCTP</a:t>
-            </a:r>
-          </a:p>
-        </p:txBody>
-      </p:sp>
-      <p:sp>
-        <p:nvSpPr>
-          <p:cNvPr id="28" name="Rounded Rectangle 27">
-            <a:extLst>
-              <a:ext uri="{FF2B5EF4-FFF2-40B4-BE49-F238E27FC236}">
-                <a16:creationId xmlns:a16="http://schemas.microsoft.com/office/drawing/2014/main" id="{CE2CDB48-3E4D-9A43-A2D2-303B021880AD}"/>
-              </a:ext>
-            </a:extLst>
-          </p:cNvPr>
-          <p:cNvSpPr/>
-          <p:nvPr/>
-        </p:nvSpPr>
-        <p:spPr>
-          <a:xfrm>
-            <a:off x="453607" y="3082330"/>
-            <a:ext cx="1276071" cy="329168"/>
-          </a:xfrm>
-          <a:prstGeom prst="roundRect">
-            <a:avLst/>
-          </a:prstGeom>
-          <a:solidFill>
-            <a:srgbClr val="CFE7F1"/>
-          </a:solidFill>
-          <a:ln w="12700" cap="flat">
-            <a:solidFill>
-              <a:schemeClr val="tx1">
-                <a:lumMod val="50000"/>
-                <a:lumOff val="50000"/>
-              </a:schemeClr>
-            </a:solidFill>
-            <a:miter lim="400000"/>
-          </a:ln>
-          <a:effectLst/>
-          <a:sp3d/>
-        </p:spPr>
-        <p:style>
-          <a:lnRef idx="0">
-            <a:scrgbClr r="0" g="0" b="0"/>
-          </a:lnRef>
-          <a:fillRef idx="0">
-            <a:scrgbClr r="0" g="0" b="0"/>
-          </a:fillRef>
-          <a:effectRef idx="0">
-            <a:scrgbClr r="0" g="0" b="0"/>
-          </a:effectRef>
-          <a:fontRef idx="none"/>
-        </p:style>
-        <p:txBody>
-          <a:bodyPr rot="0" spcFirstLastPara="1" vertOverflow="overflow" horzOverflow="overflow" vert="horz" wrap="square" lIns="25400" tIns="25400" rIns="25400" bIns="25400" numCol="1" spcCol="38100" rtlCol="0" anchor="ctr">
-            <a:spAutoFit/>
-          </a:bodyPr>
-          <a:lstStyle/>
-          <a:p>
-            <a:pPr algn="ctr" defTabSz="412750" hangingPunct="0"/>
-            <a:r>
-              <a:rPr lang="en-AU" sz="1600" kern="0" dirty="0">
-                <a:latin typeface="Arial" panose="020B0604020202020204"/>
-                <a:ea typeface="Palatino"/>
-                <a:sym typeface="Palatino"/>
-              </a:rPr>
-              <a:t>4G-NAS</a:t>
-            </a:r>
-          </a:p>
-        </p:txBody>
-      </p:sp>
-      <p:sp>
-        <p:nvSpPr>
-          <p:cNvPr id="30" name="Rounded Rectangle 29">
-            <a:extLst>
-              <a:ext uri="{FF2B5EF4-FFF2-40B4-BE49-F238E27FC236}">
-                <a16:creationId xmlns:a16="http://schemas.microsoft.com/office/drawing/2014/main" id="{40AD6B4C-0FFE-D346-B169-04C193E59EDF}"/>
-              </a:ext>
-            </a:extLst>
-          </p:cNvPr>
-          <p:cNvSpPr/>
-          <p:nvPr/>
-        </p:nvSpPr>
-        <p:spPr>
-          <a:xfrm>
-            <a:off x="2790668" y="3136234"/>
-            <a:ext cx="1276071" cy="329168"/>
-          </a:xfrm>
-          <a:prstGeom prst="roundRect">
-            <a:avLst/>
-          </a:prstGeom>
-          <a:solidFill>
-            <a:srgbClr val="CFE7F1"/>
-          </a:solidFill>
-          <a:ln w="12700" cap="flat">
-            <a:solidFill>
-              <a:schemeClr val="tx1">
-                <a:lumMod val="50000"/>
-                <a:lumOff val="50000"/>
-              </a:schemeClr>
-            </a:solidFill>
-            <a:miter lim="400000"/>
-          </a:ln>
-          <a:effectLst/>
-          <a:sp3d/>
-        </p:spPr>
-        <p:style>
-          <a:lnRef idx="0">
-            <a:scrgbClr r="0" g="0" b="0"/>
-          </a:lnRef>
-          <a:fillRef idx="0">
-            <a:scrgbClr r="0" g="0" b="0"/>
-          </a:fillRef>
-          <a:effectRef idx="0">
-            <a:scrgbClr r="0" g="0" b="0"/>
-          </a:effectRef>
-          <a:fontRef idx="none"/>
-        </p:style>
-        <p:txBody>
-          <a:bodyPr rot="0" spcFirstLastPara="1" vertOverflow="overflow" horzOverflow="overflow" vert="horz" wrap="square" lIns="25400" tIns="25400" rIns="25400" bIns="25400" numCol="1" spcCol="38100" rtlCol="0" anchor="ctr">
-            <a:spAutoFit/>
-          </a:bodyPr>
-          <a:lstStyle/>
-          <a:p>
-            <a:pPr algn="ctr" defTabSz="412750" hangingPunct="0"/>
-            <a:r>
-              <a:rPr lang="en-AU" sz="1600" kern="0" dirty="0">
-                <a:latin typeface="Arial" panose="020B0604020202020204"/>
-                <a:ea typeface="Palatino"/>
-                <a:sym typeface="Palatino"/>
-              </a:rPr>
-              <a:t>5G-NAS</a:t>
-            </a:r>
-          </a:p>
-        </p:txBody>
-      </p:sp>
-      <p:sp>
-        <p:nvSpPr>
-          <p:cNvPr id="31" name="Rounded Rectangle 30">
-            <a:extLst>
-              <a:ext uri="{FF2B5EF4-FFF2-40B4-BE49-F238E27FC236}">
-                <a16:creationId xmlns:a16="http://schemas.microsoft.com/office/drawing/2014/main" id="{5F5580C0-19EB-3F45-814D-63E9EF68ECD5}"/>
-              </a:ext>
-            </a:extLst>
-          </p:cNvPr>
-          <p:cNvSpPr/>
-          <p:nvPr/>
-        </p:nvSpPr>
-        <p:spPr>
-          <a:xfrm>
-            <a:off x="943265" y="2517910"/>
-            <a:ext cx="1276071" cy="329168"/>
-          </a:xfrm>
-          <a:prstGeom prst="roundRect">
-            <a:avLst/>
-          </a:prstGeom>
-          <a:solidFill>
-            <a:srgbClr val="CFE7F1"/>
-          </a:solidFill>
-          <a:ln w="12700" cap="flat">
-            <a:solidFill>
-              <a:schemeClr val="tx1">
-                <a:lumMod val="50000"/>
-                <a:lumOff val="50000"/>
-              </a:schemeClr>
-            </a:solidFill>
-            <a:miter lim="400000"/>
-          </a:ln>
-          <a:effectLst/>
-          <a:sp3d/>
-        </p:spPr>
-        <p:style>
-          <a:lnRef idx="0">
-            <a:scrgbClr r="0" g="0" b="0"/>
-          </a:lnRef>
-          <a:fillRef idx="0">
-            <a:scrgbClr r="0" g="0" b="0"/>
-          </a:fillRef>
-          <a:effectRef idx="0">
-            <a:scrgbClr r="0" g="0" b="0"/>
-          </a:effectRef>
-          <a:fontRef idx="none"/>
-        </p:style>
-        <p:txBody>
-          <a:bodyPr rot="0" spcFirstLastPara="1" vertOverflow="overflow" horzOverflow="overflow" vert="horz" wrap="square" lIns="25400" tIns="25400" rIns="25400" bIns="25400" numCol="1" spcCol="38100" rtlCol="0" anchor="ctr">
-            <a:spAutoFit/>
-          </a:bodyPr>
-          <a:lstStyle/>
-          <a:p>
-            <a:pPr algn="ctr" defTabSz="412750" hangingPunct="0"/>
-            <a:r>
-              <a:rPr lang="en-AU" sz="1600" kern="0" dirty="0">
-                <a:latin typeface="Arial" panose="020B0604020202020204"/>
-                <a:ea typeface="Palatino"/>
-                <a:sym typeface="Palatino"/>
-              </a:rPr>
-              <a:t>S1AP</a:t>
-            </a:r>
-          </a:p>
-        </p:txBody>
-      </p:sp>
-      <p:sp>
-        <p:nvSpPr>
-          <p:cNvPr id="32" name="Rounded Rectangle 31">
-            <a:extLst>
-              <a:ext uri="{FF2B5EF4-FFF2-40B4-BE49-F238E27FC236}">
-                <a16:creationId xmlns:a16="http://schemas.microsoft.com/office/drawing/2014/main" id="{107E1319-F5C8-2F48-8FDA-721CDA9DA344}"/>
-              </a:ext>
-            </a:extLst>
-          </p:cNvPr>
-          <p:cNvSpPr/>
-          <p:nvPr/>
-        </p:nvSpPr>
-        <p:spPr>
-          <a:xfrm>
-            <a:off x="2482053" y="2517910"/>
-            <a:ext cx="1276071" cy="329168"/>
-          </a:xfrm>
-          <a:prstGeom prst="roundRect">
-            <a:avLst/>
-          </a:prstGeom>
-          <a:solidFill>
-            <a:srgbClr val="CFE7F1"/>
-          </a:solidFill>
-          <a:ln w="12700" cap="flat">
-            <a:solidFill>
-              <a:schemeClr val="tx1">
-                <a:lumMod val="50000"/>
-                <a:lumOff val="50000"/>
-              </a:schemeClr>
-            </a:solidFill>
-            <a:miter lim="400000"/>
-          </a:ln>
-          <a:effectLst/>
-          <a:sp3d/>
-        </p:spPr>
-        <p:style>
-          <a:lnRef idx="0">
-            <a:scrgbClr r="0" g="0" b="0"/>
-          </a:lnRef>
-          <a:fillRef idx="0">
-            <a:scrgbClr r="0" g="0" b="0"/>
-          </a:fillRef>
-          <a:effectRef idx="0">
-            <a:scrgbClr r="0" g="0" b="0"/>
-          </a:effectRef>
-          <a:fontRef idx="none"/>
-        </p:style>
-        <p:txBody>
-          <a:bodyPr rot="0" spcFirstLastPara="1" vertOverflow="overflow" horzOverflow="overflow" vert="horz" wrap="square" lIns="25400" tIns="25400" rIns="25400" bIns="25400" numCol="1" spcCol="38100" rtlCol="0" anchor="ctr">
-            <a:spAutoFit/>
-          </a:bodyPr>
-          <a:lstStyle/>
-          <a:p>
-            <a:pPr algn="ctr" defTabSz="412750" hangingPunct="0"/>
-            <a:r>
-              <a:rPr lang="en-AU" sz="1600" kern="0" dirty="0">
-                <a:latin typeface="Arial" panose="020B0604020202020204"/>
-                <a:ea typeface="Palatino"/>
-                <a:sym typeface="Palatino"/>
-              </a:rPr>
-              <a:t>NGAP</a:t>
-            </a:r>
-          </a:p>
-        </p:txBody>
-      </p:sp>
-      <p:cxnSp>
-        <p:nvCxnSpPr>
-          <p:cNvPr id="33" name="Straight Arrow Connector 32">
-            <a:extLst>
-              <a:ext uri="{FF2B5EF4-FFF2-40B4-BE49-F238E27FC236}">
-                <a16:creationId xmlns:a16="http://schemas.microsoft.com/office/drawing/2014/main" id="{99B0B54F-37F3-2A42-8D52-C60AA2C400FE}"/>
-              </a:ext>
-            </a:extLst>
-          </p:cNvPr>
-          <p:cNvCxnSpPr>
-            <a:cxnSpLocks/>
-            <a:endCxn id="27" idx="0"/>
-          </p:cNvCxnSpPr>
-          <p:nvPr/>
-        </p:nvCxnSpPr>
-        <p:spPr>
-          <a:xfrm>
-            <a:off x="1091642" y="3411498"/>
-            <a:ext cx="1008566" cy="419684"/>
-          </a:xfrm>
-          <a:prstGeom prst="straightConnector1">
-            <a:avLst/>
-          </a:prstGeom>
-          <a:noFill/>
-          <a:ln w="25400" cap="flat">
-            <a:solidFill>
-              <a:schemeClr val="accent1"/>
-            </a:solidFill>
-            <a:prstDash val="solid"/>
-            <a:miter lim="400000"/>
-            <a:headEnd type="triangle" w="med" len="med"/>
-            <a:tailEnd type="triangle" w="med" len="med"/>
-          </a:ln>
-          <a:effectLst/>
-          <a:sp3d/>
-        </p:spPr>
-        <p:style>
-          <a:lnRef idx="0">
-            <a:scrgbClr r="0" g="0" b="0"/>
-          </a:lnRef>
-          <a:fillRef idx="0">
-            <a:scrgbClr r="0" g="0" b="0"/>
-          </a:fillRef>
-          <a:effectRef idx="0">
-            <a:scrgbClr r="0" g="0" b="0"/>
-          </a:effectRef>
-          <a:fontRef idx="none"/>
-        </p:style>
-      </p:cxnSp>
-      <p:cxnSp>
-        <p:nvCxnSpPr>
-          <p:cNvPr id="34" name="Straight Arrow Connector 33">
-            <a:extLst>
-              <a:ext uri="{FF2B5EF4-FFF2-40B4-BE49-F238E27FC236}">
-                <a16:creationId xmlns:a16="http://schemas.microsoft.com/office/drawing/2014/main" id="{17009850-E346-654C-B3E4-C03BFD4B9171}"/>
-              </a:ext>
-            </a:extLst>
-          </p:cNvPr>
-          <p:cNvCxnSpPr>
-            <a:cxnSpLocks/>
-            <a:stCxn id="31" idx="2"/>
-            <a:endCxn id="27" idx="0"/>
-          </p:cNvCxnSpPr>
-          <p:nvPr/>
-        </p:nvCxnSpPr>
-        <p:spPr>
-          <a:xfrm>
-            <a:off x="1581301" y="2847078"/>
-            <a:ext cx="518907" cy="984104"/>
-          </a:xfrm>
-          <a:prstGeom prst="straightConnector1">
-            <a:avLst/>
-          </a:prstGeom>
-          <a:noFill/>
-          <a:ln w="25400" cap="flat">
-            <a:solidFill>
-              <a:schemeClr val="accent1"/>
-            </a:solidFill>
-            <a:prstDash val="solid"/>
-            <a:miter lim="400000"/>
-            <a:headEnd type="triangle" w="med" len="med"/>
-            <a:tailEnd type="triangle" w="med" len="med"/>
-          </a:ln>
-          <a:effectLst/>
-          <a:sp3d/>
-        </p:spPr>
-        <p:style>
-          <a:lnRef idx="0">
-            <a:scrgbClr r="0" g="0" b="0"/>
-          </a:lnRef>
-          <a:fillRef idx="0">
-            <a:scrgbClr r="0" g="0" b="0"/>
-          </a:fillRef>
-          <a:effectRef idx="0">
-            <a:scrgbClr r="0" g="0" b="0"/>
-          </a:effectRef>
-          <a:fontRef idx="none"/>
-        </p:style>
-      </p:cxnSp>
-      <p:cxnSp>
-        <p:nvCxnSpPr>
-          <p:cNvPr id="35" name="Straight Arrow Connector 34">
-            <a:extLst>
-              <a:ext uri="{FF2B5EF4-FFF2-40B4-BE49-F238E27FC236}">
-                <a16:creationId xmlns:a16="http://schemas.microsoft.com/office/drawing/2014/main" id="{11BC14A5-CCB6-D345-81D3-5DEA653396FF}"/>
-              </a:ext>
-            </a:extLst>
-          </p:cNvPr>
-          <p:cNvCxnSpPr>
-            <a:cxnSpLocks/>
-            <a:stCxn id="32" idx="2"/>
-            <a:endCxn id="27" idx="0"/>
-          </p:cNvCxnSpPr>
-          <p:nvPr/>
-        </p:nvCxnSpPr>
-        <p:spPr>
-          <a:xfrm flipH="1">
-            <a:off x="2100208" y="2847078"/>
-            <a:ext cx="1019881" cy="984104"/>
-          </a:xfrm>
-          <a:prstGeom prst="straightConnector1">
-            <a:avLst/>
-          </a:prstGeom>
-          <a:noFill/>
-          <a:ln w="25400" cap="flat">
-            <a:solidFill>
-              <a:schemeClr val="accent1"/>
-            </a:solidFill>
-            <a:prstDash val="solid"/>
-            <a:miter lim="400000"/>
-            <a:headEnd type="triangle" w="med" len="med"/>
-            <a:tailEnd type="triangle" w="med" len="med"/>
-          </a:ln>
-          <a:effectLst/>
-          <a:sp3d/>
-        </p:spPr>
-        <p:style>
-          <a:lnRef idx="0">
-            <a:scrgbClr r="0" g="0" b="0"/>
-          </a:lnRef>
-          <a:fillRef idx="0">
-            <a:scrgbClr r="0" g="0" b="0"/>
-          </a:fillRef>
-          <a:effectRef idx="0">
-            <a:scrgbClr r="0" g="0" b="0"/>
-          </a:effectRef>
-          <a:fontRef idx="none"/>
-        </p:style>
-      </p:cxnSp>
-      <p:cxnSp>
-        <p:nvCxnSpPr>
-          <p:cNvPr id="36" name="Straight Arrow Connector 35">
-            <a:extLst>
-              <a:ext uri="{FF2B5EF4-FFF2-40B4-BE49-F238E27FC236}">
-                <a16:creationId xmlns:a16="http://schemas.microsoft.com/office/drawing/2014/main" id="{94727C89-77CC-CD45-86DA-AEC6F6CE1D9C}"/>
-              </a:ext>
-            </a:extLst>
-          </p:cNvPr>
-          <p:cNvCxnSpPr>
-            <a:cxnSpLocks/>
-            <a:stCxn id="30" idx="2"/>
-            <a:endCxn id="27" idx="0"/>
-          </p:cNvCxnSpPr>
-          <p:nvPr/>
-        </p:nvCxnSpPr>
-        <p:spPr>
-          <a:xfrm flipH="1">
-            <a:off x="2100208" y="3465402"/>
-            <a:ext cx="1328496" cy="365780"/>
-          </a:xfrm>
-          <a:prstGeom prst="straightConnector1">
-            <a:avLst/>
-          </a:prstGeom>
-          <a:noFill/>
-          <a:ln w="25400" cap="flat">
-            <a:solidFill>
-              <a:schemeClr val="accent1"/>
-            </a:solidFill>
-            <a:prstDash val="solid"/>
-            <a:miter lim="400000"/>
-            <a:headEnd type="triangle" w="med" len="med"/>
-            <a:tailEnd type="triangle" w="med" len="med"/>
-          </a:ln>
-          <a:effectLst/>
-          <a:sp3d/>
-        </p:spPr>
-        <p:style>
-          <a:lnRef idx="0">
-            <a:scrgbClr r="0" g="0" b="0"/>
-          </a:lnRef>
-          <a:fillRef idx="0">
-            <a:scrgbClr r="0" g="0" b="0"/>
-          </a:fillRef>
-          <a:effectRef idx="0">
-            <a:scrgbClr r="0" g="0" b="0"/>
-          </a:effectRef>
-          <a:fontRef idx="none"/>
-        </p:style>
-      </p:cxnSp>
-      <p:cxnSp>
-        <p:nvCxnSpPr>
-          <p:cNvPr id="39" name="Straight Arrow Connector 38">
-            <a:extLst>
-              <a:ext uri="{FF2B5EF4-FFF2-40B4-BE49-F238E27FC236}">
-                <a16:creationId xmlns:a16="http://schemas.microsoft.com/office/drawing/2014/main" id="{F9A8BA84-C0E5-2545-8D3A-9E3A0B1898EA}"/>
-              </a:ext>
-            </a:extLst>
-          </p:cNvPr>
-          <p:cNvCxnSpPr>
-            <a:cxnSpLocks/>
-          </p:cNvCxnSpPr>
-          <p:nvPr/>
-        </p:nvCxnSpPr>
-        <p:spPr>
-          <a:xfrm flipH="1">
-            <a:off x="5334000" y="3026191"/>
-            <a:ext cx="720527" cy="0"/>
-          </a:xfrm>
-          <a:prstGeom prst="straightConnector1">
-            <a:avLst/>
-          </a:prstGeom>
-          <a:noFill/>
-          <a:ln w="25400" cap="flat">
-            <a:solidFill>
-              <a:schemeClr val="accent1"/>
-            </a:solidFill>
-            <a:prstDash val="solid"/>
-            <a:miter lim="400000"/>
-            <a:headEnd type="triangle" w="med" len="med"/>
-            <a:tailEnd type="triangle" w="med" len="med"/>
-          </a:ln>
-          <a:effectLst/>
-          <a:sp3d/>
-        </p:spPr>
-        <p:style>
-          <a:lnRef idx="0">
-            <a:scrgbClr r="0" g="0" b="0"/>
-          </a:lnRef>
-          <a:fillRef idx="0">
-            <a:scrgbClr r="0" g="0" b="0"/>
-          </a:fillRef>
-          <a:effectRef idx="0">
-            <a:scrgbClr r="0" g="0" b="0"/>
-          </a:effectRef>
-          <a:fontRef idx="none"/>
-        </p:style>
-      </p:cxnSp>
-      <p:sp>
-        <p:nvSpPr>
-          <p:cNvPr id="41" name="TextBox 40">
-            <a:extLst>
-              <a:ext uri="{FF2B5EF4-FFF2-40B4-BE49-F238E27FC236}">
-                <a16:creationId xmlns:a16="http://schemas.microsoft.com/office/drawing/2014/main" id="{CD0B250D-20D1-5C40-ABF5-67F24F1416F5}"/>
-              </a:ext>
-            </a:extLst>
-          </p:cNvPr>
-          <p:cNvSpPr txBox="1"/>
-          <p:nvPr/>
-        </p:nvSpPr>
-        <p:spPr>
-          <a:xfrm>
-            <a:off x="5358601" y="2607201"/>
-            <a:ext cx="718145" cy="379591"/>
-          </a:xfrm>
-          <a:prstGeom prst="rect">
-            <a:avLst/>
-          </a:prstGeom>
-          <a:noFill/>
-          <a:ln w="12700" cap="flat">
-            <a:noFill/>
-            <a:miter lim="400000"/>
-          </a:ln>
-          <a:effectLst/>
-          <a:sp3d/>
-        </p:spPr>
-        <p:style>
-          <a:lnRef idx="0">
-            <a:scrgbClr r="0" g="0" b="0"/>
-          </a:lnRef>
-          <a:fillRef idx="0">
-            <a:scrgbClr r="0" g="0" b="0"/>
-          </a:fillRef>
-          <a:effectRef idx="0">
-            <a:scrgbClr r="0" g="0" b="0"/>
-          </a:effectRef>
-          <a:fontRef idx="none"/>
-        </p:style>
-        <p:txBody>
-          <a:bodyPr rot="0" spcFirstLastPara="1" vertOverflow="overflow" horzOverflow="overflow" vert="horz" wrap="none" lIns="50800" tIns="50800" rIns="50800" bIns="50800" numCol="1" spcCol="38100" rtlCol="0" anchor="ctr">
-            <a:spAutoFit/>
-          </a:bodyPr>
-          <a:lstStyle/>
-          <a:p>
-            <a:pPr marL="0" marR="0" indent="0" algn="ctr" defTabSz="825500" rtl="0" fontAlgn="auto" latinLnBrk="0" hangingPunct="0">
-              <a:lnSpc>
-                <a:spcPct val="100000"/>
-              </a:lnSpc>
-              <a:spcBef>
-                <a:spcPts val="0"/>
-              </a:spcBef>
-              <a:spcAft>
-                <a:spcPts val="0"/>
-              </a:spcAft>
-              <a:buClrTx/>
-              <a:buSzTx/>
-              <a:buFontTx/>
-              <a:buNone/>
-              <a:tabLst/>
-            </a:pPr>
-            <a:r>
-              <a:rPr kumimoji="0" lang="en-AU" b="0" i="0" u="none" strike="noStrike" cap="none" spc="0" normalizeH="0" baseline="0" dirty="0" err="1">
-                <a:ln>
-                  <a:noFill/>
-                </a:ln>
-                <a:solidFill>
-                  <a:srgbClr val="414141"/>
-                </a:solidFill>
-                <a:effectLst/>
-                <a:uFillTx/>
-                <a:latin typeface="+mj-lt"/>
-                <a:ea typeface="Palatino"/>
-                <a:cs typeface="Palatino"/>
-                <a:sym typeface="Palatino"/>
-              </a:rPr>
-              <a:t>gRPC</a:t>
-            </a:r>
-            <a:endParaRPr kumimoji="0" lang="en-AU" b="0" i="0" u="none" strike="noStrike" cap="none" spc="0" normalizeH="0" baseline="0" dirty="0">
-              <a:ln>
-                <a:noFill/>
-              </a:ln>
-              <a:solidFill>
-                <a:srgbClr val="414141"/>
-              </a:solidFill>
-              <a:effectLst/>
-              <a:uFillTx/>
-              <a:latin typeface="+mj-lt"/>
-              <a:ea typeface="Palatino"/>
-              <a:cs typeface="Palatino"/>
-              <a:sym typeface="Palatino"/>
-            </a:endParaRPr>
-          </a:p>
-        </p:txBody>
-      </p:sp>
-      <p:cxnSp>
-        <p:nvCxnSpPr>
-          <p:cNvPr id="43" name="Straight Connector 42">
-            <a:extLst>
-              <a:ext uri="{FF2B5EF4-FFF2-40B4-BE49-F238E27FC236}">
-                <a16:creationId xmlns:a16="http://schemas.microsoft.com/office/drawing/2014/main" id="{449EBDA5-D575-2D42-B08A-79BA8AD71BAE}"/>
-              </a:ext>
-            </a:extLst>
-          </p:cNvPr>
-          <p:cNvCxnSpPr>
-            <a:cxnSpLocks/>
-          </p:cNvCxnSpPr>
-          <p:nvPr/>
-        </p:nvCxnSpPr>
-        <p:spPr>
-          <a:xfrm>
-            <a:off x="6054526" y="4160350"/>
-            <a:ext cx="5574766" cy="0"/>
-          </a:xfrm>
-          <a:prstGeom prst="line">
-            <a:avLst/>
-          </a:prstGeom>
-          <a:noFill/>
-          <a:ln w="25400" cap="flat">
-            <a:solidFill>
-              <a:schemeClr val="tx1"/>
-            </a:solidFill>
-            <a:prstDash val="sysDash"/>
-            <a:miter lim="400000"/>
-          </a:ln>
-          <a:effectLst/>
-          <a:sp3d/>
-        </p:spPr>
-        <p:style>
-          <a:lnRef idx="0">
-            <a:scrgbClr r="0" g="0" b="0"/>
-          </a:lnRef>
-          <a:fillRef idx="0">
-            <a:scrgbClr r="0" g="0" b="0"/>
-          </a:fillRef>
-          <a:effectRef idx="0">
-            <a:scrgbClr r="0" g="0" b="0"/>
-          </a:effectRef>
-          <a:fontRef idx="none"/>
-        </p:style>
-      </p:cxnSp>
-      <p:cxnSp>
-        <p:nvCxnSpPr>
-          <p:cNvPr id="46" name="Elbow Connector 45">
-            <a:extLst>
-              <a:ext uri="{FF2B5EF4-FFF2-40B4-BE49-F238E27FC236}">
-                <a16:creationId xmlns:a16="http://schemas.microsoft.com/office/drawing/2014/main" id="{99ADD232-BED8-2B43-9ED3-D72253227423}"/>
-              </a:ext>
-            </a:extLst>
-          </p:cNvPr>
-          <p:cNvCxnSpPr>
-            <a:cxnSpLocks/>
-            <a:stCxn id="58" idx="3"/>
-            <a:endCxn id="16" idx="1"/>
-          </p:cNvCxnSpPr>
-          <p:nvPr/>
-        </p:nvCxnSpPr>
-        <p:spPr>
-          <a:xfrm flipV="1">
-            <a:off x="3346935" y="4461142"/>
-            <a:ext cx="4320701" cy="1277624"/>
-          </a:xfrm>
-          <a:prstGeom prst="bentConnector3">
-            <a:avLst>
-              <a:gd name="adj1" fmla="val 9844"/>
-            </a:avLst>
-          </a:prstGeom>
-          <a:noFill/>
-          <a:ln w="25400" cap="flat">
-            <a:solidFill>
-              <a:srgbClr val="414141"/>
-            </a:solidFill>
-            <a:prstDash val="solid"/>
-            <a:miter lim="400000"/>
-            <a:headEnd type="triangle"/>
-            <a:tailEnd type="triangle"/>
-          </a:ln>
-          <a:effectLst/>
-          <a:sp3d/>
-        </p:spPr>
-        <p:style>
-          <a:lnRef idx="0">
-            <a:scrgbClr r="0" g="0" b="0"/>
-          </a:lnRef>
-          <a:fillRef idx="0">
-            <a:scrgbClr r="0" g="0" b="0"/>
-          </a:fillRef>
-          <a:effectRef idx="0">
-            <a:scrgbClr r="0" g="0" b="0"/>
-          </a:effectRef>
-          <a:fontRef idx="none"/>
-        </p:style>
-      </p:cxnSp>
-      <p:sp>
-        <p:nvSpPr>
-          <p:cNvPr id="52" name="TextBox 51">
-            <a:extLst>
-              <a:ext uri="{FF2B5EF4-FFF2-40B4-BE49-F238E27FC236}">
-                <a16:creationId xmlns:a16="http://schemas.microsoft.com/office/drawing/2014/main" id="{A209E662-FEA2-3C45-AFD5-D66289D2DC8F}"/>
-              </a:ext>
-            </a:extLst>
-          </p:cNvPr>
-          <p:cNvSpPr txBox="1"/>
-          <p:nvPr/>
-        </p:nvSpPr>
-        <p:spPr>
-          <a:xfrm>
-            <a:off x="1149779" y="1778884"/>
-            <a:ext cx="2436564" cy="379591"/>
-          </a:xfrm>
-          <a:prstGeom prst="rect">
-            <a:avLst/>
-          </a:prstGeom>
-          <a:noFill/>
-          <a:ln w="12700" cap="flat">
-            <a:noFill/>
-            <a:miter lim="400000"/>
-          </a:ln>
-          <a:effectLst/>
-          <a:sp3d/>
-        </p:spPr>
-        <p:style>
-          <a:lnRef idx="0">
-            <a:scrgbClr r="0" g="0" b="0"/>
-          </a:lnRef>
-          <a:fillRef idx="0">
-            <a:scrgbClr r="0" g="0" b="0"/>
-          </a:fillRef>
-          <a:effectRef idx="0">
-            <a:scrgbClr r="0" g="0" b="0"/>
-          </a:effectRef>
-          <a:fontRef idx="none"/>
-        </p:style>
-        <p:txBody>
-          <a:bodyPr rot="0" spcFirstLastPara="1" vertOverflow="overflow" horzOverflow="overflow" vert="horz" wrap="none" lIns="50800" tIns="50800" rIns="50800" bIns="50800" numCol="1" spcCol="38100" rtlCol="0" anchor="ctr">
-            <a:spAutoFit/>
-          </a:bodyPr>
-          <a:lstStyle/>
-          <a:p>
-            <a:pPr marL="0" marR="0" indent="0" algn="ctr" defTabSz="825500" rtl="0" fontAlgn="auto" latinLnBrk="0" hangingPunct="0">
-              <a:lnSpc>
-                <a:spcPct val="100000"/>
-              </a:lnSpc>
-              <a:spcBef>
-                <a:spcPts val="0"/>
-              </a:spcBef>
-              <a:spcAft>
-                <a:spcPts val="0"/>
-              </a:spcAft>
-              <a:buClrTx/>
-              <a:buSzTx/>
-              <a:buFontTx/>
-              <a:buNone/>
-              <a:tabLst/>
-            </a:pPr>
-            <a:r>
-              <a:rPr kumimoji="0" lang="en-AU" b="0" i="0" u="none" strike="noStrike" cap="none" spc="0" normalizeH="0" baseline="0" dirty="0">
-                <a:ln>
-                  <a:noFill/>
-                </a:ln>
-                <a:solidFill>
-                  <a:srgbClr val="414141"/>
-                </a:solidFill>
-                <a:effectLst/>
-                <a:uFillTx/>
-                <a:ea typeface="Palatino"/>
-                <a:cs typeface="Palatino"/>
-                <a:sym typeface="Palatino"/>
-              </a:rPr>
-              <a:t>RAN-specific protocols</a:t>
-            </a:r>
-          </a:p>
-        </p:txBody>
-      </p:sp>
-      <p:sp>
-        <p:nvSpPr>
-          <p:cNvPr id="55" name="TextBox 54">
-            <a:extLst>
-              <a:ext uri="{FF2B5EF4-FFF2-40B4-BE49-F238E27FC236}">
-                <a16:creationId xmlns:a16="http://schemas.microsoft.com/office/drawing/2014/main" id="{9ABC7393-C161-EE43-B5DB-532797048C29}"/>
-              </a:ext>
-            </a:extLst>
-          </p:cNvPr>
-          <p:cNvSpPr txBox="1"/>
-          <p:nvPr/>
-        </p:nvSpPr>
-        <p:spPr>
-          <a:xfrm>
-            <a:off x="8016934" y="991843"/>
-            <a:ext cx="718145" cy="379591"/>
-          </a:xfrm>
-          <a:prstGeom prst="rect">
-            <a:avLst/>
-          </a:prstGeom>
-          <a:noFill/>
-          <a:ln w="12700" cap="flat">
-            <a:noFill/>
-            <a:miter lim="400000"/>
-          </a:ln>
-          <a:effectLst/>
-          <a:sp3d/>
-        </p:spPr>
-        <p:style>
-          <a:lnRef idx="0">
-            <a:scrgbClr r="0" g="0" b="0"/>
-          </a:lnRef>
-          <a:fillRef idx="0">
-            <a:scrgbClr r="0" g="0" b="0"/>
-          </a:fillRef>
-          <a:effectRef idx="0">
-            <a:scrgbClr r="0" g="0" b="0"/>
-          </a:effectRef>
-          <a:fontRef idx="none"/>
-        </p:style>
-        <p:txBody>
-          <a:bodyPr rot="0" spcFirstLastPara="1" vertOverflow="overflow" horzOverflow="overflow" vert="horz" wrap="none" lIns="50800" tIns="50800" rIns="50800" bIns="50800" numCol="1" spcCol="38100" rtlCol="0" anchor="ctr">
-            <a:spAutoFit/>
-          </a:bodyPr>
-          <a:lstStyle/>
-          <a:p>
-            <a:pPr marL="0" marR="0" indent="0" algn="ctr" defTabSz="825500" rtl="0" fontAlgn="auto" latinLnBrk="0" hangingPunct="0">
-              <a:lnSpc>
-                <a:spcPct val="100000"/>
-              </a:lnSpc>
-              <a:spcBef>
-                <a:spcPts val="0"/>
-              </a:spcBef>
-              <a:spcAft>
-                <a:spcPts val="0"/>
-              </a:spcAft>
-              <a:buClrTx/>
-              <a:buSzTx/>
-              <a:buFontTx/>
-              <a:buNone/>
-              <a:tabLst/>
-            </a:pPr>
-            <a:r>
-              <a:rPr kumimoji="0" lang="en-AU" b="0" i="0" u="none" strike="noStrike" cap="none" spc="0" normalizeH="0" baseline="0" dirty="0" err="1">
-                <a:ln>
-                  <a:noFill/>
-                </a:ln>
-                <a:solidFill>
-                  <a:srgbClr val="414141"/>
-                </a:solidFill>
-                <a:effectLst/>
-                <a:uFillTx/>
-                <a:latin typeface="+mj-lt"/>
-                <a:ea typeface="Palatino"/>
-                <a:cs typeface="Palatino"/>
-                <a:sym typeface="Palatino"/>
-              </a:rPr>
-              <a:t>gRPC</a:t>
-            </a:r>
-            <a:endParaRPr kumimoji="0" lang="en-AU" b="0" i="0" u="none" strike="noStrike" cap="none" spc="0" normalizeH="0" baseline="0" dirty="0">
-              <a:ln>
-                <a:noFill/>
-              </a:ln>
-              <a:solidFill>
-                <a:srgbClr val="414141"/>
-              </a:solidFill>
-              <a:effectLst/>
-              <a:uFillTx/>
-              <a:latin typeface="+mj-lt"/>
-              <a:ea typeface="Palatino"/>
-              <a:cs typeface="Palatino"/>
-              <a:sym typeface="Palatino"/>
-            </a:endParaRPr>
-          </a:p>
-        </p:txBody>
-      </p:sp>
-      <p:sp>
-        <p:nvSpPr>
-          <p:cNvPr id="37" name="Rectangle 36">
-            <a:extLst>
-              <a:ext uri="{FF2B5EF4-FFF2-40B4-BE49-F238E27FC236}">
-                <a16:creationId xmlns:a16="http://schemas.microsoft.com/office/drawing/2014/main" id="{065FAA50-5668-4A46-9D8A-BBB0B2CBC887}"/>
-              </a:ext>
-            </a:extLst>
-          </p:cNvPr>
-          <p:cNvSpPr/>
-          <p:nvPr/>
-        </p:nvSpPr>
-        <p:spPr>
-          <a:xfrm>
-            <a:off x="175846" y="1380022"/>
-            <a:ext cx="11570675" cy="3611387"/>
-          </a:xfrm>
-          <a:prstGeom prst="rect">
-            <a:avLst/>
-          </a:prstGeom>
-          <a:noFill/>
-          <a:ln w="12700" cap="flat">
-            <a:solidFill>
-              <a:schemeClr val="tx1"/>
-            </a:solidFill>
-            <a:prstDash val="sysDash"/>
             <a:miter lim="400000"/>
           </a:ln>
           <a:effectLst/>
@@ -8897,10 +7074,1390 @@
       </p:sp>
       <p:sp>
         <p:nvSpPr>
-          <p:cNvPr id="38" name="TextBox 37">
-            <a:extLst>
-              <a:ext uri="{FF2B5EF4-FFF2-40B4-BE49-F238E27FC236}">
-                <a16:creationId xmlns:a16="http://schemas.microsoft.com/office/drawing/2014/main" id="{77310EF1-CF17-A544-AD10-E9132F81FE80}"/>
+          <p:cNvPr id="10" name="Rounded Rectangle 9">
+            <a:extLst>
+              <a:ext uri="{FF2B5EF4-FFF2-40B4-BE49-F238E27FC236}">
+                <a16:creationId xmlns:a16="http://schemas.microsoft.com/office/drawing/2014/main" id="{EC2607FB-0264-7F43-A778-A7391D6F4B56}"/>
+              </a:ext>
+            </a:extLst>
+          </p:cNvPr>
+          <p:cNvSpPr/>
+          <p:nvPr/>
+        </p:nvSpPr>
+        <p:spPr>
+          <a:xfrm>
+            <a:off x="7332784" y="400989"/>
+            <a:ext cx="2719754" cy="601583"/>
+          </a:xfrm>
+          <a:prstGeom prst="roundRect">
+            <a:avLst/>
+          </a:prstGeom>
+          <a:solidFill>
+            <a:srgbClr val="5B9BD5"/>
+          </a:solidFill>
+          <a:ln w="12700" cap="flat">
+            <a:noFill/>
+            <a:miter lim="400000"/>
+          </a:ln>
+          <a:effectLst/>
+          <a:sp3d/>
+        </p:spPr>
+        <p:style>
+          <a:lnRef idx="0">
+            <a:scrgbClr r="0" g="0" b="0"/>
+          </a:lnRef>
+          <a:fillRef idx="0">
+            <a:scrgbClr r="0" g="0" b="0"/>
+          </a:fillRef>
+          <a:effectRef idx="0">
+            <a:scrgbClr r="0" g="0" b="0"/>
+          </a:effectRef>
+          <a:fontRef idx="none"/>
+        </p:style>
+        <p:txBody>
+          <a:bodyPr rot="0" spcFirstLastPara="1" vertOverflow="overflow" horzOverflow="overflow" vert="horz" wrap="square" lIns="25400" tIns="25400" rIns="25400" bIns="25400" numCol="1" spcCol="38100" rtlCol="0" anchor="ctr">
+            <a:spAutoFit/>
+          </a:bodyPr>
+          <a:lstStyle/>
+          <a:p>
+            <a:pPr algn="ctr" defTabSz="412750" hangingPunct="0"/>
+            <a:r>
+              <a:rPr lang="en-AU" sz="1600" kern="0" dirty="0">
+                <a:solidFill>
+                  <a:schemeClr val="bg1"/>
+                </a:solidFill>
+                <a:ea typeface="Palatino"/>
+                <a:sym typeface="Palatino"/>
+              </a:rPr>
+              <a:t>Central Control &amp; Management</a:t>
+            </a:r>
+          </a:p>
+          <a:p>
+            <a:pPr algn="ctr" defTabSz="412750" hangingPunct="0"/>
+            <a:r>
+              <a:rPr lang="en-AU" sz="1600" kern="0" dirty="0">
+                <a:solidFill>
+                  <a:schemeClr val="bg1"/>
+                </a:solidFill>
+                <a:ea typeface="Palatino"/>
+                <a:sym typeface="Palatino"/>
+              </a:rPr>
+              <a:t>(Orchestrator)</a:t>
+            </a:r>
+          </a:p>
+        </p:txBody>
+      </p:sp>
+      <p:sp>
+        <p:nvSpPr>
+          <p:cNvPr id="57" name="Rounded Rectangle 56">
+            <a:extLst>
+              <a:ext uri="{FF2B5EF4-FFF2-40B4-BE49-F238E27FC236}">
+                <a16:creationId xmlns:a16="http://schemas.microsoft.com/office/drawing/2014/main" id="{862A3C49-A572-2945-86B7-DC12A4FD8216}"/>
+              </a:ext>
+            </a:extLst>
+          </p:cNvPr>
+          <p:cNvSpPr/>
+          <p:nvPr/>
+        </p:nvSpPr>
+        <p:spPr>
+          <a:xfrm>
+            <a:off x="6079618" y="1627204"/>
+            <a:ext cx="2421747" cy="601583"/>
+          </a:xfrm>
+          <a:prstGeom prst="roundRect">
+            <a:avLst/>
+          </a:prstGeom>
+          <a:solidFill>
+            <a:srgbClr val="CFE7F1"/>
+          </a:solidFill>
+          <a:ln w="12700" cap="flat">
+            <a:noFill/>
+            <a:miter lim="400000"/>
+          </a:ln>
+          <a:effectLst/>
+          <a:sp3d/>
+        </p:spPr>
+        <p:style>
+          <a:lnRef idx="0">
+            <a:scrgbClr r="0" g="0" b="0"/>
+          </a:lnRef>
+          <a:fillRef idx="0">
+            <a:scrgbClr r="0" g="0" b="0"/>
+          </a:fillRef>
+          <a:effectRef idx="0">
+            <a:scrgbClr r="0" g="0" b="0"/>
+          </a:effectRef>
+          <a:fontRef idx="none"/>
+        </p:style>
+        <p:txBody>
+          <a:bodyPr rot="0" spcFirstLastPara="1" vertOverflow="overflow" horzOverflow="overflow" vert="horz" wrap="square" lIns="25400" tIns="25400" rIns="25400" bIns="25400" numCol="1" spcCol="38100" rtlCol="0" anchor="ctr">
+            <a:spAutoFit/>
+          </a:bodyPr>
+          <a:lstStyle/>
+          <a:p>
+            <a:pPr algn="ctr" defTabSz="412750" hangingPunct="0"/>
+            <a:r>
+              <a:rPr lang="en-AU" sz="1600" kern="0" dirty="0">
+                <a:ea typeface="Palatino"/>
+                <a:sym typeface="Palatino"/>
+              </a:rPr>
+              <a:t>Access Control &amp;</a:t>
+            </a:r>
+            <a:br>
+              <a:rPr lang="en-AU" sz="1600" kern="0" dirty="0">
+                <a:ea typeface="Palatino"/>
+                <a:sym typeface="Palatino"/>
+              </a:rPr>
+            </a:br>
+            <a:r>
+              <a:rPr lang="en-AU" sz="1600" kern="0" dirty="0">
+                <a:ea typeface="Palatino"/>
+                <a:sym typeface="Palatino"/>
+              </a:rPr>
+              <a:t>Management</a:t>
+            </a:r>
+          </a:p>
+        </p:txBody>
+      </p:sp>
+      <p:sp>
+        <p:nvSpPr>
+          <p:cNvPr id="22" name="Rounded Rectangle 21">
+            <a:extLst>
+              <a:ext uri="{FF2B5EF4-FFF2-40B4-BE49-F238E27FC236}">
+                <a16:creationId xmlns:a16="http://schemas.microsoft.com/office/drawing/2014/main" id="{56ACEF58-7B64-124A-87D9-832F33331CC8}"/>
+              </a:ext>
+            </a:extLst>
+          </p:cNvPr>
+          <p:cNvSpPr/>
+          <p:nvPr/>
+        </p:nvSpPr>
+        <p:spPr>
+          <a:xfrm>
+            <a:off x="6079618" y="2428169"/>
+            <a:ext cx="2421747" cy="601583"/>
+          </a:xfrm>
+          <a:prstGeom prst="roundRect">
+            <a:avLst/>
+          </a:prstGeom>
+          <a:solidFill>
+            <a:srgbClr val="CFE7F1"/>
+          </a:solidFill>
+          <a:ln w="12700" cap="flat">
+            <a:noFill/>
+            <a:miter lim="400000"/>
+          </a:ln>
+          <a:effectLst/>
+          <a:sp3d/>
+        </p:spPr>
+        <p:style>
+          <a:lnRef idx="0">
+            <a:scrgbClr r="0" g="0" b="0"/>
+          </a:lnRef>
+          <a:fillRef idx="0">
+            <a:scrgbClr r="0" g="0" b="0"/>
+          </a:fillRef>
+          <a:effectRef idx="0">
+            <a:scrgbClr r="0" g="0" b="0"/>
+          </a:effectRef>
+          <a:fontRef idx="none"/>
+        </p:style>
+        <p:txBody>
+          <a:bodyPr rot="0" spcFirstLastPara="1" vertOverflow="overflow" horzOverflow="overflow" vert="horz" wrap="square" lIns="25400" tIns="25400" rIns="25400" bIns="25400" numCol="1" spcCol="38100" rtlCol="0" anchor="ctr">
+            <a:spAutoFit/>
+          </a:bodyPr>
+          <a:lstStyle/>
+          <a:p>
+            <a:pPr algn="ctr" defTabSz="412750" hangingPunct="0"/>
+            <a:r>
+              <a:rPr lang="en-AU" sz="1600" kern="0" dirty="0">
+                <a:ea typeface="Palatino"/>
+                <a:sym typeface="Palatino"/>
+              </a:rPr>
+              <a:t>Subscriber </a:t>
+            </a:r>
+            <a:br>
+              <a:rPr lang="en-AU" sz="1600" kern="0" dirty="0">
+                <a:ea typeface="Palatino"/>
+                <a:sym typeface="Palatino"/>
+              </a:rPr>
+            </a:br>
+            <a:r>
+              <a:rPr lang="en-AU" sz="1600" kern="0" dirty="0">
+                <a:ea typeface="Palatino"/>
+                <a:sym typeface="Palatino"/>
+              </a:rPr>
+              <a:t>Management</a:t>
+            </a:r>
+          </a:p>
+        </p:txBody>
+      </p:sp>
+      <p:sp>
+        <p:nvSpPr>
+          <p:cNvPr id="16" name="Rounded Rectangle 15">
+            <a:extLst>
+              <a:ext uri="{FF2B5EF4-FFF2-40B4-BE49-F238E27FC236}">
+                <a16:creationId xmlns:a16="http://schemas.microsoft.com/office/drawing/2014/main" id="{2EA268C2-0DF4-3F4D-BFBE-8960BAA428C8}"/>
+              </a:ext>
+            </a:extLst>
+          </p:cNvPr>
+          <p:cNvSpPr/>
+          <p:nvPr/>
+        </p:nvSpPr>
+        <p:spPr>
+          <a:xfrm>
+            <a:off x="7526960" y="4296558"/>
+            <a:ext cx="2421747" cy="329168"/>
+          </a:xfrm>
+          <a:prstGeom prst="roundRect">
+            <a:avLst/>
+          </a:prstGeom>
+          <a:solidFill>
+            <a:schemeClr val="bg2">
+              <a:lumMod val="50000"/>
+            </a:schemeClr>
+          </a:solidFill>
+          <a:ln w="12700" cap="flat">
+            <a:solidFill>
+              <a:schemeClr val="tx1">
+                <a:lumMod val="50000"/>
+                <a:lumOff val="50000"/>
+              </a:schemeClr>
+            </a:solidFill>
+            <a:miter lim="400000"/>
+          </a:ln>
+          <a:effectLst/>
+          <a:sp3d/>
+        </p:spPr>
+        <p:style>
+          <a:lnRef idx="0">
+            <a:scrgbClr r="0" g="0" b="0"/>
+          </a:lnRef>
+          <a:fillRef idx="0">
+            <a:scrgbClr r="0" g="0" b="0"/>
+          </a:fillRef>
+          <a:effectRef idx="0">
+            <a:scrgbClr r="0" g="0" b="0"/>
+          </a:effectRef>
+          <a:fontRef idx="none"/>
+        </p:style>
+        <p:txBody>
+          <a:bodyPr rot="0" spcFirstLastPara="1" vertOverflow="overflow" horzOverflow="overflow" vert="horz" wrap="square" lIns="25400" tIns="25400" rIns="25400" bIns="25400" numCol="1" spcCol="38100" rtlCol="0" anchor="ctr">
+            <a:spAutoFit/>
+          </a:bodyPr>
+          <a:lstStyle/>
+          <a:p>
+            <a:pPr algn="ctr" defTabSz="412750" hangingPunct="0"/>
+            <a:r>
+              <a:rPr lang="en-AU" sz="1600" kern="0" dirty="0">
+                <a:solidFill>
+                  <a:schemeClr val="bg1"/>
+                </a:solidFill>
+                <a:latin typeface="Arial" panose="020B0604020202020204"/>
+                <a:ea typeface="Palatino"/>
+                <a:sym typeface="Palatino"/>
+              </a:rPr>
+              <a:t>Data Plane (OVS)</a:t>
+            </a:r>
+          </a:p>
+        </p:txBody>
+      </p:sp>
+      <p:sp>
+        <p:nvSpPr>
+          <p:cNvPr id="17" name="Rounded Rectangle 16">
+            <a:extLst>
+              <a:ext uri="{FF2B5EF4-FFF2-40B4-BE49-F238E27FC236}">
+                <a16:creationId xmlns:a16="http://schemas.microsoft.com/office/drawing/2014/main" id="{89496D19-A0DF-414C-BAB4-F6141CE2ABE5}"/>
+              </a:ext>
+            </a:extLst>
+          </p:cNvPr>
+          <p:cNvSpPr/>
+          <p:nvPr/>
+        </p:nvSpPr>
+        <p:spPr>
+          <a:xfrm>
+            <a:off x="8862695" y="1627204"/>
+            <a:ext cx="2387798" cy="601583"/>
+          </a:xfrm>
+          <a:prstGeom prst="roundRect">
+            <a:avLst/>
+          </a:prstGeom>
+          <a:solidFill>
+            <a:srgbClr val="CFE7F1"/>
+          </a:solidFill>
+          <a:ln w="12700" cap="flat">
+            <a:noFill/>
+            <a:miter lim="400000"/>
+          </a:ln>
+          <a:effectLst/>
+          <a:sp3d/>
+        </p:spPr>
+        <p:style>
+          <a:lnRef idx="0">
+            <a:scrgbClr r="0" g="0" b="0"/>
+          </a:lnRef>
+          <a:fillRef idx="0">
+            <a:scrgbClr r="0" g="0" b="0"/>
+          </a:fillRef>
+          <a:effectRef idx="0">
+            <a:scrgbClr r="0" g="0" b="0"/>
+          </a:effectRef>
+          <a:fontRef idx="none"/>
+        </p:style>
+        <p:txBody>
+          <a:bodyPr rot="0" spcFirstLastPara="1" vertOverflow="overflow" horzOverflow="overflow" vert="horz" wrap="square" lIns="25400" tIns="25400" rIns="25400" bIns="25400" numCol="1" spcCol="38100" rtlCol="0" anchor="ctr">
+            <a:spAutoFit/>
+          </a:bodyPr>
+          <a:lstStyle/>
+          <a:p>
+            <a:pPr algn="ctr" defTabSz="412750" hangingPunct="0"/>
+            <a:r>
+              <a:rPr lang="en-AU" sz="1600" kern="0" dirty="0">
+                <a:ea typeface="Palatino"/>
+                <a:sym typeface="Palatino"/>
+              </a:rPr>
+              <a:t>Device </a:t>
+            </a:r>
+            <a:br>
+              <a:rPr lang="en-AU" sz="1600" kern="0" dirty="0">
+                <a:ea typeface="Palatino"/>
+                <a:sym typeface="Palatino"/>
+              </a:rPr>
+            </a:br>
+            <a:r>
+              <a:rPr lang="en-AU" sz="1600" kern="0" dirty="0">
+                <a:ea typeface="Palatino"/>
+                <a:sym typeface="Palatino"/>
+              </a:rPr>
+              <a:t>Management</a:t>
+            </a:r>
+          </a:p>
+        </p:txBody>
+      </p:sp>
+      <p:sp>
+        <p:nvSpPr>
+          <p:cNvPr id="18" name="Rounded Rectangle 17">
+            <a:extLst>
+              <a:ext uri="{FF2B5EF4-FFF2-40B4-BE49-F238E27FC236}">
+                <a16:creationId xmlns:a16="http://schemas.microsoft.com/office/drawing/2014/main" id="{0FEE4C65-3823-4F47-A8D6-E44B0A2FFB28}"/>
+              </a:ext>
+            </a:extLst>
+          </p:cNvPr>
+          <p:cNvSpPr/>
+          <p:nvPr/>
+        </p:nvSpPr>
+        <p:spPr>
+          <a:xfrm>
+            <a:off x="8862694" y="2436145"/>
+            <a:ext cx="2387799" cy="601583"/>
+          </a:xfrm>
+          <a:prstGeom prst="roundRect">
+            <a:avLst/>
+          </a:prstGeom>
+          <a:solidFill>
+            <a:srgbClr val="CFE7F1"/>
+          </a:solidFill>
+          <a:ln w="12700" cap="flat">
+            <a:noFill/>
+            <a:miter lim="400000"/>
+          </a:ln>
+          <a:effectLst/>
+          <a:sp3d/>
+        </p:spPr>
+        <p:style>
+          <a:lnRef idx="0">
+            <a:scrgbClr r="0" g="0" b="0"/>
+          </a:lnRef>
+          <a:fillRef idx="0">
+            <a:scrgbClr r="0" g="0" b="0"/>
+          </a:fillRef>
+          <a:effectRef idx="0">
+            <a:scrgbClr r="0" g="0" b="0"/>
+          </a:effectRef>
+          <a:fontRef idx="none"/>
+        </p:style>
+        <p:txBody>
+          <a:bodyPr rot="0" spcFirstLastPara="1" vertOverflow="overflow" horzOverflow="overflow" vert="horz" wrap="square" lIns="25400" tIns="25400" rIns="25400" bIns="25400" numCol="1" spcCol="38100" rtlCol="0" anchor="ctr">
+            <a:spAutoFit/>
+          </a:bodyPr>
+          <a:lstStyle/>
+          <a:p>
+            <a:pPr algn="ctr" defTabSz="412750" hangingPunct="0"/>
+            <a:r>
+              <a:rPr lang="en-AU" sz="1600" kern="0" dirty="0">
+                <a:ea typeface="Palatino"/>
+                <a:sym typeface="Palatino"/>
+              </a:rPr>
+              <a:t>Session &amp; Policy</a:t>
+            </a:r>
+            <a:br>
+              <a:rPr lang="en-AU" sz="1600" kern="0" dirty="0">
+                <a:ea typeface="Palatino"/>
+                <a:sym typeface="Palatino"/>
+              </a:rPr>
+            </a:br>
+            <a:r>
+              <a:rPr lang="en-AU" sz="1600" kern="0" dirty="0">
+                <a:ea typeface="Palatino"/>
+                <a:sym typeface="Palatino"/>
+              </a:rPr>
+              <a:t>Management</a:t>
+            </a:r>
+          </a:p>
+        </p:txBody>
+      </p:sp>
+      <p:sp>
+        <p:nvSpPr>
+          <p:cNvPr id="19" name="Rounded Rectangle 18">
+            <a:extLst>
+              <a:ext uri="{FF2B5EF4-FFF2-40B4-BE49-F238E27FC236}">
+                <a16:creationId xmlns:a16="http://schemas.microsoft.com/office/drawing/2014/main" id="{42FEC876-51CD-C64E-9766-94B660098298}"/>
+              </a:ext>
+            </a:extLst>
+          </p:cNvPr>
+          <p:cNvSpPr/>
+          <p:nvPr/>
+        </p:nvSpPr>
+        <p:spPr>
+          <a:xfrm>
+            <a:off x="8874417" y="3233362"/>
+            <a:ext cx="2405728" cy="601583"/>
+          </a:xfrm>
+          <a:prstGeom prst="roundRect">
+            <a:avLst/>
+          </a:prstGeom>
+          <a:solidFill>
+            <a:srgbClr val="CFE7F1"/>
+          </a:solidFill>
+          <a:ln w="12700" cap="flat">
+            <a:noFill/>
+            <a:miter lim="400000"/>
+          </a:ln>
+          <a:effectLst/>
+          <a:sp3d/>
+        </p:spPr>
+        <p:style>
+          <a:lnRef idx="0">
+            <a:scrgbClr r="0" g="0" b="0"/>
+          </a:lnRef>
+          <a:fillRef idx="0">
+            <a:scrgbClr r="0" g="0" b="0"/>
+          </a:fillRef>
+          <a:effectRef idx="0">
+            <a:scrgbClr r="0" g="0" b="0"/>
+          </a:effectRef>
+          <a:fontRef idx="none"/>
+        </p:style>
+        <p:txBody>
+          <a:bodyPr rot="0" spcFirstLastPara="1" vertOverflow="overflow" horzOverflow="overflow" vert="horz" wrap="square" lIns="25400" tIns="25400" rIns="25400" bIns="25400" numCol="1" spcCol="38100" rtlCol="0" anchor="ctr">
+            <a:spAutoFit/>
+          </a:bodyPr>
+          <a:lstStyle/>
+          <a:p>
+            <a:pPr algn="ctr" defTabSz="412750" hangingPunct="0"/>
+            <a:r>
+              <a:rPr lang="en-AU" sz="1600" kern="0" dirty="0">
+                <a:ea typeface="Palatino"/>
+                <a:sym typeface="Palatino"/>
+              </a:rPr>
+              <a:t>Telemetry &amp; </a:t>
+            </a:r>
+            <a:br>
+              <a:rPr lang="en-AU" sz="1600" kern="0" dirty="0">
+                <a:ea typeface="Palatino"/>
+                <a:sym typeface="Palatino"/>
+              </a:rPr>
+            </a:br>
+            <a:r>
+              <a:rPr lang="en-AU" sz="1600" kern="0" dirty="0">
+                <a:ea typeface="Palatino"/>
+                <a:sym typeface="Palatino"/>
+              </a:rPr>
+              <a:t>Logging</a:t>
+            </a:r>
+          </a:p>
+        </p:txBody>
+      </p:sp>
+      <p:cxnSp>
+        <p:nvCxnSpPr>
+          <p:cNvPr id="4" name="Straight Arrow Connector 3">
+            <a:extLst>
+              <a:ext uri="{FF2B5EF4-FFF2-40B4-BE49-F238E27FC236}">
+                <a16:creationId xmlns:a16="http://schemas.microsoft.com/office/drawing/2014/main" id="{9F934019-4534-AE4F-983F-936A607ACE86}"/>
+              </a:ext>
+            </a:extLst>
+          </p:cNvPr>
+          <p:cNvCxnSpPr>
+            <a:cxnSpLocks/>
+            <a:stCxn id="10" idx="2"/>
+            <a:endCxn id="3" idx="0"/>
+          </p:cNvCxnSpPr>
+          <p:nvPr/>
+        </p:nvCxnSpPr>
+        <p:spPr>
+          <a:xfrm>
+            <a:off x="8692661" y="1002572"/>
+            <a:ext cx="1" cy="459512"/>
+          </a:xfrm>
+          <a:prstGeom prst="straightConnector1">
+            <a:avLst/>
+          </a:prstGeom>
+          <a:noFill/>
+          <a:ln w="19050" cap="flat">
+            <a:solidFill>
+              <a:srgbClr val="0070C0"/>
+            </a:solidFill>
+            <a:prstDash val="solid"/>
+            <a:miter lim="400000"/>
+            <a:headEnd type="triangle" w="med" len="med"/>
+            <a:tailEnd type="triangle" w="med" len="med"/>
+          </a:ln>
+          <a:effectLst/>
+          <a:sp3d/>
+        </p:spPr>
+        <p:style>
+          <a:lnRef idx="0">
+            <a:scrgbClr r="0" g="0" b="0"/>
+          </a:lnRef>
+          <a:fillRef idx="0">
+            <a:scrgbClr r="0" g="0" b="0"/>
+          </a:fillRef>
+          <a:effectRef idx="0">
+            <a:scrgbClr r="0" g="0" b="0"/>
+          </a:effectRef>
+          <a:fontRef idx="none"/>
+        </p:style>
+      </p:cxnSp>
+      <p:sp>
+        <p:nvSpPr>
+          <p:cNvPr id="58" name="Rounded Rectangle 57">
+            <a:extLst>
+              <a:ext uri="{FF2B5EF4-FFF2-40B4-BE49-F238E27FC236}">
+                <a16:creationId xmlns:a16="http://schemas.microsoft.com/office/drawing/2014/main" id="{71331B65-83C8-FD44-9A9F-2058EA9F5644}"/>
+              </a:ext>
+            </a:extLst>
+          </p:cNvPr>
+          <p:cNvSpPr/>
+          <p:nvPr/>
+        </p:nvSpPr>
+        <p:spPr>
+          <a:xfrm>
+            <a:off x="1551125" y="5574182"/>
+            <a:ext cx="1655134" cy="329168"/>
+          </a:xfrm>
+          <a:prstGeom prst="roundRect">
+            <a:avLst/>
+          </a:prstGeom>
+          <a:solidFill>
+            <a:srgbClr val="5B9BD5"/>
+          </a:solidFill>
+          <a:ln w="12700" cap="flat">
+            <a:noFill/>
+            <a:miter lim="400000"/>
+          </a:ln>
+          <a:effectLst/>
+          <a:sp3d/>
+        </p:spPr>
+        <p:style>
+          <a:lnRef idx="0">
+            <a:scrgbClr r="0" g="0" b="0"/>
+          </a:lnRef>
+          <a:fillRef idx="0">
+            <a:scrgbClr r="0" g="0" b="0"/>
+          </a:fillRef>
+          <a:effectRef idx="0">
+            <a:scrgbClr r="0" g="0" b="0"/>
+          </a:effectRef>
+          <a:fontRef idx="none"/>
+        </p:style>
+        <p:txBody>
+          <a:bodyPr rot="0" spcFirstLastPara="1" vertOverflow="overflow" horzOverflow="overflow" vert="horz" wrap="square" lIns="25400" tIns="25400" rIns="25400" bIns="25400" numCol="1" spcCol="38100" rtlCol="0" anchor="ctr">
+            <a:spAutoFit/>
+          </a:bodyPr>
+          <a:lstStyle/>
+          <a:p>
+            <a:pPr algn="ctr" defTabSz="412750" hangingPunct="0"/>
+            <a:r>
+              <a:rPr lang="en-AU" sz="1600" kern="0" dirty="0">
+                <a:solidFill>
+                  <a:prstClr val="white"/>
+                </a:solidFill>
+                <a:ea typeface="Palatino"/>
+                <a:sym typeface="Palatino"/>
+              </a:rPr>
+              <a:t>eNB/gNB</a:t>
+            </a:r>
+          </a:p>
+        </p:txBody>
+      </p:sp>
+      <p:cxnSp>
+        <p:nvCxnSpPr>
+          <p:cNvPr id="25" name="Straight Arrow Connector 24">
+            <a:extLst>
+              <a:ext uri="{FF2B5EF4-FFF2-40B4-BE49-F238E27FC236}">
+                <a16:creationId xmlns:a16="http://schemas.microsoft.com/office/drawing/2014/main" id="{4A339110-8DED-BB4B-AEF4-BFD598D13D45}"/>
+              </a:ext>
+            </a:extLst>
+          </p:cNvPr>
+          <p:cNvCxnSpPr>
+            <a:cxnSpLocks/>
+          </p:cNvCxnSpPr>
+          <p:nvPr/>
+        </p:nvCxnSpPr>
+        <p:spPr>
+          <a:xfrm>
+            <a:off x="2425584" y="4160350"/>
+            <a:ext cx="0" cy="1413832"/>
+          </a:xfrm>
+          <a:prstGeom prst="straightConnector1">
+            <a:avLst/>
+          </a:prstGeom>
+          <a:noFill/>
+          <a:ln w="19050" cap="flat">
+            <a:solidFill>
+              <a:srgbClr val="0070C0"/>
+            </a:solidFill>
+            <a:prstDash val="solid"/>
+            <a:miter lim="400000"/>
+            <a:headEnd type="triangle" w="med" len="med"/>
+            <a:tailEnd type="triangle" w="med" len="med"/>
+          </a:ln>
+          <a:effectLst/>
+          <a:sp3d/>
+        </p:spPr>
+        <p:style>
+          <a:lnRef idx="0">
+            <a:scrgbClr r="0" g="0" b="0"/>
+          </a:lnRef>
+          <a:fillRef idx="0">
+            <a:scrgbClr r="0" g="0" b="0"/>
+          </a:fillRef>
+          <a:effectRef idx="0">
+            <a:scrgbClr r="0" g="0" b="0"/>
+          </a:effectRef>
+          <a:fontRef idx="none"/>
+        </p:style>
+      </p:cxnSp>
+      <p:sp>
+        <p:nvSpPr>
+          <p:cNvPr id="21" name="Rectangle 20">
+            <a:extLst>
+              <a:ext uri="{FF2B5EF4-FFF2-40B4-BE49-F238E27FC236}">
+                <a16:creationId xmlns:a16="http://schemas.microsoft.com/office/drawing/2014/main" id="{3381E0AD-EDDE-104C-BD59-0B127522766A}"/>
+              </a:ext>
+            </a:extLst>
+          </p:cNvPr>
+          <p:cNvSpPr/>
+          <p:nvPr/>
+        </p:nvSpPr>
+        <p:spPr>
+          <a:xfrm flipH="1">
+            <a:off x="312930" y="5161342"/>
+            <a:ext cx="3075040" cy="1506819"/>
+          </a:xfrm>
+          <a:prstGeom prst="rect">
+            <a:avLst/>
+          </a:prstGeom>
+          <a:noFill/>
+          <a:ln w="25400" cap="flat" cmpd="sng" algn="ctr">
+            <a:solidFill>
+              <a:srgbClr val="626262"/>
+            </a:solidFill>
+            <a:prstDash val="sysDot"/>
+          </a:ln>
+          <a:effectLst/>
+        </p:spPr>
+        <p:txBody>
+          <a:bodyPr rtlCol="0" anchor="b"/>
+          <a:lstStyle/>
+          <a:p>
+            <a:pPr marL="0" marR="0" lvl="0" indent="0" algn="r" defTabSz="457200" eaLnBrk="1" fontAlgn="auto" latinLnBrk="0" hangingPunct="1">
+              <a:lnSpc>
+                <a:spcPct val="100000"/>
+              </a:lnSpc>
+              <a:spcBef>
+                <a:spcPts val="0"/>
+              </a:spcBef>
+              <a:spcAft>
+                <a:spcPts val="0"/>
+              </a:spcAft>
+              <a:buClrTx/>
+              <a:buSzTx/>
+              <a:buFontTx/>
+              <a:buNone/>
+              <a:tabLst/>
+              <a:defRPr/>
+            </a:pPr>
+            <a:r>
+              <a:rPr kumimoji="0" lang="en-US" b="0" i="0" u="none" strike="noStrike" kern="1200" cap="none" spc="0" normalizeH="0" baseline="0" noProof="0" dirty="0">
+                <a:ln>
+                  <a:noFill/>
+                </a:ln>
+                <a:solidFill>
+                  <a:srgbClr val="626262">
+                    <a:lumMod val="50000"/>
+                  </a:srgbClr>
+                </a:solidFill>
+                <a:effectLst/>
+                <a:uLnTx/>
+                <a:uFillTx/>
+                <a:ea typeface="+mn-ea"/>
+                <a:cs typeface="+mn-cs"/>
+              </a:rPr>
+              <a:t>Radio Access Network</a:t>
+            </a:r>
+          </a:p>
+        </p:txBody>
+      </p:sp>
+      <p:sp>
+        <p:nvSpPr>
+          <p:cNvPr id="20" name="Rounded Rectangle 19">
+            <a:extLst>
+              <a:ext uri="{FF2B5EF4-FFF2-40B4-BE49-F238E27FC236}">
+                <a16:creationId xmlns:a16="http://schemas.microsoft.com/office/drawing/2014/main" id="{6806371B-383C-7941-9C69-F848B32126A5}"/>
+              </a:ext>
+            </a:extLst>
+          </p:cNvPr>
+          <p:cNvSpPr/>
+          <p:nvPr/>
+        </p:nvSpPr>
+        <p:spPr>
+          <a:xfrm>
+            <a:off x="6095637" y="3284721"/>
+            <a:ext cx="2405728" cy="601583"/>
+          </a:xfrm>
+          <a:prstGeom prst="roundRect">
+            <a:avLst/>
+          </a:prstGeom>
+          <a:solidFill>
+            <a:srgbClr val="CFE7F1"/>
+          </a:solidFill>
+          <a:ln w="12700" cap="flat">
+            <a:noFill/>
+            <a:miter lim="400000"/>
+          </a:ln>
+          <a:effectLst/>
+          <a:sp3d/>
+        </p:spPr>
+        <p:style>
+          <a:lnRef idx="0">
+            <a:scrgbClr r="0" g="0" b="0"/>
+          </a:lnRef>
+          <a:fillRef idx="0">
+            <a:scrgbClr r="0" g="0" b="0"/>
+          </a:fillRef>
+          <a:effectRef idx="0">
+            <a:scrgbClr r="0" g="0" b="0"/>
+          </a:effectRef>
+          <a:fontRef idx="none"/>
+        </p:style>
+        <p:txBody>
+          <a:bodyPr rot="0" spcFirstLastPara="1" vertOverflow="overflow" horzOverflow="overflow" vert="horz" wrap="square" lIns="25400" tIns="25400" rIns="25400" bIns="25400" numCol="1" spcCol="38100" rtlCol="0" anchor="ctr">
+            <a:spAutoFit/>
+          </a:bodyPr>
+          <a:lstStyle/>
+          <a:p>
+            <a:pPr algn="ctr" defTabSz="412750" hangingPunct="0"/>
+            <a:r>
+              <a:rPr lang="en-AU" sz="1600" kern="0" dirty="0">
+                <a:ea typeface="Palatino"/>
+                <a:sym typeface="Palatino"/>
+              </a:rPr>
+              <a:t>Data Plane </a:t>
+            </a:r>
+            <a:br>
+              <a:rPr lang="en-AU" sz="1600" kern="0" dirty="0">
+                <a:ea typeface="Palatino"/>
+                <a:sym typeface="Palatino"/>
+              </a:rPr>
+            </a:br>
+            <a:r>
+              <a:rPr lang="en-AU" sz="1600" kern="0" dirty="0">
+                <a:ea typeface="Palatino"/>
+                <a:sym typeface="Palatino"/>
+              </a:rPr>
+              <a:t>Configuration</a:t>
+            </a:r>
+          </a:p>
+        </p:txBody>
+      </p:sp>
+      <p:sp>
+        <p:nvSpPr>
+          <p:cNvPr id="27" name="Rounded Rectangle 26">
+            <a:extLst>
+              <a:ext uri="{FF2B5EF4-FFF2-40B4-BE49-F238E27FC236}">
+                <a16:creationId xmlns:a16="http://schemas.microsoft.com/office/drawing/2014/main" id="{B6D2CA22-C153-4242-A3F3-6079321722AE}"/>
+              </a:ext>
+            </a:extLst>
+          </p:cNvPr>
+          <p:cNvSpPr/>
+          <p:nvPr/>
+        </p:nvSpPr>
+        <p:spPr>
+          <a:xfrm>
+            <a:off x="756668" y="3831182"/>
+            <a:ext cx="2405728" cy="329168"/>
+          </a:xfrm>
+          <a:prstGeom prst="roundRect">
+            <a:avLst/>
+          </a:prstGeom>
+          <a:solidFill>
+            <a:srgbClr val="CFE7F1"/>
+          </a:solidFill>
+          <a:ln w="12700" cap="flat">
+            <a:noFill/>
+            <a:miter lim="400000"/>
+          </a:ln>
+          <a:effectLst/>
+          <a:sp3d/>
+        </p:spPr>
+        <p:style>
+          <a:lnRef idx="0">
+            <a:scrgbClr r="0" g="0" b="0"/>
+          </a:lnRef>
+          <a:fillRef idx="0">
+            <a:scrgbClr r="0" g="0" b="0"/>
+          </a:fillRef>
+          <a:effectRef idx="0">
+            <a:scrgbClr r="0" g="0" b="0"/>
+          </a:effectRef>
+          <a:fontRef idx="none"/>
+        </p:style>
+        <p:txBody>
+          <a:bodyPr rot="0" spcFirstLastPara="1" vertOverflow="overflow" horzOverflow="overflow" vert="horz" wrap="square" lIns="25400" tIns="25400" rIns="25400" bIns="25400" numCol="1" spcCol="38100" rtlCol="0" anchor="ctr">
+            <a:spAutoFit/>
+          </a:bodyPr>
+          <a:lstStyle/>
+          <a:p>
+            <a:pPr algn="ctr" defTabSz="412750" hangingPunct="0"/>
+            <a:r>
+              <a:rPr lang="en-AU" sz="1600" kern="0" dirty="0">
+                <a:solidFill>
+                  <a:schemeClr val="tx2">
+                    <a:lumMod val="10000"/>
+                  </a:schemeClr>
+                </a:solidFill>
+                <a:latin typeface="Calibri" panose="020F0502020204030204" pitchFamily="34" charset="0"/>
+                <a:ea typeface="Palatino"/>
+                <a:cs typeface="Calibri" panose="020F0502020204030204" pitchFamily="34" charset="0"/>
+                <a:sym typeface="Palatino"/>
+              </a:rPr>
+              <a:t>SCTP</a:t>
+            </a:r>
+          </a:p>
+        </p:txBody>
+      </p:sp>
+      <p:sp>
+        <p:nvSpPr>
+          <p:cNvPr id="28" name="Rounded Rectangle 27">
+            <a:extLst>
+              <a:ext uri="{FF2B5EF4-FFF2-40B4-BE49-F238E27FC236}">
+                <a16:creationId xmlns:a16="http://schemas.microsoft.com/office/drawing/2014/main" id="{CE2CDB48-3E4D-9A43-A2D2-303B021880AD}"/>
+              </a:ext>
+            </a:extLst>
+          </p:cNvPr>
+          <p:cNvSpPr/>
+          <p:nvPr/>
+        </p:nvSpPr>
+        <p:spPr>
+          <a:xfrm>
+            <a:off x="271366" y="3082330"/>
+            <a:ext cx="1276071" cy="329168"/>
+          </a:xfrm>
+          <a:prstGeom prst="roundRect">
+            <a:avLst/>
+          </a:prstGeom>
+          <a:solidFill>
+            <a:srgbClr val="CFE7F1"/>
+          </a:solidFill>
+          <a:ln w="12700" cap="flat">
+            <a:noFill/>
+            <a:miter lim="400000"/>
+          </a:ln>
+          <a:effectLst/>
+          <a:sp3d/>
+        </p:spPr>
+        <p:style>
+          <a:lnRef idx="0">
+            <a:scrgbClr r="0" g="0" b="0"/>
+          </a:lnRef>
+          <a:fillRef idx="0">
+            <a:scrgbClr r="0" g="0" b="0"/>
+          </a:fillRef>
+          <a:effectRef idx="0">
+            <a:scrgbClr r="0" g="0" b="0"/>
+          </a:effectRef>
+          <a:fontRef idx="none"/>
+        </p:style>
+        <p:txBody>
+          <a:bodyPr rot="0" spcFirstLastPara="1" vertOverflow="overflow" horzOverflow="overflow" vert="horz" wrap="square" lIns="25400" tIns="25400" rIns="25400" bIns="25400" numCol="1" spcCol="38100" rtlCol="0" anchor="ctr">
+            <a:spAutoFit/>
+          </a:bodyPr>
+          <a:lstStyle/>
+          <a:p>
+            <a:pPr algn="ctr" defTabSz="412750" hangingPunct="0"/>
+            <a:r>
+              <a:rPr lang="en-AU" sz="1600" kern="0" dirty="0">
+                <a:solidFill>
+                  <a:schemeClr val="tx2">
+                    <a:lumMod val="10000"/>
+                  </a:schemeClr>
+                </a:solidFill>
+                <a:ea typeface="Palatino"/>
+                <a:sym typeface="Palatino"/>
+              </a:rPr>
+              <a:t>4G-NAS</a:t>
+            </a:r>
+          </a:p>
+        </p:txBody>
+      </p:sp>
+      <p:sp>
+        <p:nvSpPr>
+          <p:cNvPr id="30" name="Rounded Rectangle 29">
+            <a:extLst>
+              <a:ext uri="{FF2B5EF4-FFF2-40B4-BE49-F238E27FC236}">
+                <a16:creationId xmlns:a16="http://schemas.microsoft.com/office/drawing/2014/main" id="{40AD6B4C-0FFE-D346-B169-04C193E59EDF}"/>
+              </a:ext>
+            </a:extLst>
+          </p:cNvPr>
+          <p:cNvSpPr/>
+          <p:nvPr/>
+        </p:nvSpPr>
+        <p:spPr>
+          <a:xfrm>
+            <a:off x="2691557" y="3136234"/>
+            <a:ext cx="1276071" cy="329168"/>
+          </a:xfrm>
+          <a:prstGeom prst="roundRect">
+            <a:avLst/>
+          </a:prstGeom>
+          <a:solidFill>
+            <a:srgbClr val="CFE7F1"/>
+          </a:solidFill>
+          <a:ln w="12700" cap="flat">
+            <a:noFill/>
+            <a:miter lim="400000"/>
+          </a:ln>
+          <a:effectLst/>
+          <a:sp3d/>
+        </p:spPr>
+        <p:style>
+          <a:lnRef idx="0">
+            <a:scrgbClr r="0" g="0" b="0"/>
+          </a:lnRef>
+          <a:fillRef idx="0">
+            <a:scrgbClr r="0" g="0" b="0"/>
+          </a:fillRef>
+          <a:effectRef idx="0">
+            <a:scrgbClr r="0" g="0" b="0"/>
+          </a:effectRef>
+          <a:fontRef idx="none"/>
+        </p:style>
+        <p:txBody>
+          <a:bodyPr rot="0" spcFirstLastPara="1" vertOverflow="overflow" horzOverflow="overflow" vert="horz" wrap="square" lIns="25400" tIns="25400" rIns="25400" bIns="25400" numCol="1" spcCol="38100" rtlCol="0" anchor="ctr">
+            <a:spAutoFit/>
+          </a:bodyPr>
+          <a:lstStyle/>
+          <a:p>
+            <a:pPr algn="ctr" defTabSz="412750" hangingPunct="0"/>
+            <a:r>
+              <a:rPr lang="en-AU" sz="1600" kern="0" dirty="0">
+                <a:solidFill>
+                  <a:schemeClr val="tx2">
+                    <a:lumMod val="10000"/>
+                  </a:schemeClr>
+                </a:solidFill>
+                <a:ea typeface="Palatino"/>
+                <a:sym typeface="Palatino"/>
+              </a:rPr>
+              <a:t>5G-NAS</a:t>
+            </a:r>
+          </a:p>
+        </p:txBody>
+      </p:sp>
+      <p:sp>
+        <p:nvSpPr>
+          <p:cNvPr id="31" name="Rounded Rectangle 30">
+            <a:extLst>
+              <a:ext uri="{FF2B5EF4-FFF2-40B4-BE49-F238E27FC236}">
+                <a16:creationId xmlns:a16="http://schemas.microsoft.com/office/drawing/2014/main" id="{5F5580C0-19EB-3F45-814D-63E9EF68ECD5}"/>
+              </a:ext>
+            </a:extLst>
+          </p:cNvPr>
+          <p:cNvSpPr/>
+          <p:nvPr/>
+        </p:nvSpPr>
+        <p:spPr>
+          <a:xfrm>
+            <a:off x="885719" y="2517910"/>
+            <a:ext cx="1276071" cy="329168"/>
+          </a:xfrm>
+          <a:prstGeom prst="roundRect">
+            <a:avLst/>
+          </a:prstGeom>
+          <a:solidFill>
+            <a:srgbClr val="CFE7F1"/>
+          </a:solidFill>
+          <a:ln w="12700" cap="flat">
+            <a:noFill/>
+            <a:miter lim="400000"/>
+          </a:ln>
+          <a:effectLst/>
+          <a:sp3d/>
+        </p:spPr>
+        <p:style>
+          <a:lnRef idx="0">
+            <a:scrgbClr r="0" g="0" b="0"/>
+          </a:lnRef>
+          <a:fillRef idx="0">
+            <a:scrgbClr r="0" g="0" b="0"/>
+          </a:fillRef>
+          <a:effectRef idx="0">
+            <a:scrgbClr r="0" g="0" b="0"/>
+          </a:effectRef>
+          <a:fontRef idx="none"/>
+        </p:style>
+        <p:txBody>
+          <a:bodyPr rot="0" spcFirstLastPara="1" vertOverflow="overflow" horzOverflow="overflow" vert="horz" wrap="square" lIns="25400" tIns="25400" rIns="25400" bIns="25400" numCol="1" spcCol="38100" rtlCol="0" anchor="ctr">
+            <a:spAutoFit/>
+          </a:bodyPr>
+          <a:lstStyle/>
+          <a:p>
+            <a:pPr algn="ctr" defTabSz="412750" hangingPunct="0"/>
+            <a:r>
+              <a:rPr lang="en-AU" sz="1600" kern="0" dirty="0">
+                <a:solidFill>
+                  <a:schemeClr val="tx1">
+                    <a:lumMod val="95000"/>
+                    <a:lumOff val="5000"/>
+                  </a:schemeClr>
+                </a:solidFill>
+                <a:ea typeface="Palatino"/>
+                <a:sym typeface="Palatino"/>
+              </a:rPr>
+              <a:t>S1AP</a:t>
+            </a:r>
+          </a:p>
+        </p:txBody>
+      </p:sp>
+      <p:sp>
+        <p:nvSpPr>
+          <p:cNvPr id="32" name="Rounded Rectangle 31">
+            <a:extLst>
+              <a:ext uri="{FF2B5EF4-FFF2-40B4-BE49-F238E27FC236}">
+                <a16:creationId xmlns:a16="http://schemas.microsoft.com/office/drawing/2014/main" id="{107E1319-F5C8-2F48-8FDA-721CDA9DA344}"/>
+              </a:ext>
+            </a:extLst>
+          </p:cNvPr>
+          <p:cNvSpPr/>
+          <p:nvPr/>
+        </p:nvSpPr>
+        <p:spPr>
+          <a:xfrm>
+            <a:off x="2258247" y="2517910"/>
+            <a:ext cx="1276071" cy="329168"/>
+          </a:xfrm>
+          <a:prstGeom prst="roundRect">
+            <a:avLst/>
+          </a:prstGeom>
+          <a:solidFill>
+            <a:srgbClr val="CFE7F1"/>
+          </a:solidFill>
+          <a:ln w="12700" cap="flat">
+            <a:noFill/>
+            <a:miter lim="400000"/>
+          </a:ln>
+          <a:effectLst/>
+          <a:sp3d/>
+        </p:spPr>
+        <p:style>
+          <a:lnRef idx="0">
+            <a:scrgbClr r="0" g="0" b="0"/>
+          </a:lnRef>
+          <a:fillRef idx="0">
+            <a:scrgbClr r="0" g="0" b="0"/>
+          </a:fillRef>
+          <a:effectRef idx="0">
+            <a:scrgbClr r="0" g="0" b="0"/>
+          </a:effectRef>
+          <a:fontRef idx="none"/>
+        </p:style>
+        <p:txBody>
+          <a:bodyPr rot="0" spcFirstLastPara="1" vertOverflow="overflow" horzOverflow="overflow" vert="horz" wrap="square" lIns="25400" tIns="25400" rIns="25400" bIns="25400" numCol="1" spcCol="38100" rtlCol="0" anchor="ctr">
+            <a:spAutoFit/>
+          </a:bodyPr>
+          <a:lstStyle/>
+          <a:p>
+            <a:pPr algn="ctr" defTabSz="412750" hangingPunct="0"/>
+            <a:r>
+              <a:rPr lang="en-AU" sz="1600" kern="0" dirty="0">
+                <a:solidFill>
+                  <a:schemeClr val="tx2">
+                    <a:lumMod val="10000"/>
+                  </a:schemeClr>
+                </a:solidFill>
+                <a:latin typeface="Calibri" panose="020F0502020204030204" pitchFamily="34" charset="0"/>
+                <a:ea typeface="Palatino"/>
+                <a:cs typeface="Calibri" panose="020F0502020204030204" pitchFamily="34" charset="0"/>
+                <a:sym typeface="Palatino"/>
+              </a:rPr>
+              <a:t>NGAP</a:t>
+            </a:r>
+          </a:p>
+        </p:txBody>
+      </p:sp>
+      <p:cxnSp>
+        <p:nvCxnSpPr>
+          <p:cNvPr id="33" name="Straight Arrow Connector 32">
+            <a:extLst>
+              <a:ext uri="{FF2B5EF4-FFF2-40B4-BE49-F238E27FC236}">
+                <a16:creationId xmlns:a16="http://schemas.microsoft.com/office/drawing/2014/main" id="{99B0B54F-37F3-2A42-8D52-C60AA2C400FE}"/>
+              </a:ext>
+            </a:extLst>
+          </p:cNvPr>
+          <p:cNvCxnSpPr>
+            <a:cxnSpLocks/>
+            <a:endCxn id="27" idx="0"/>
+          </p:cNvCxnSpPr>
+          <p:nvPr/>
+        </p:nvCxnSpPr>
+        <p:spPr>
+          <a:xfrm>
+            <a:off x="950966" y="3411498"/>
+            <a:ext cx="1008566" cy="419684"/>
+          </a:xfrm>
+          <a:prstGeom prst="straightConnector1">
+            <a:avLst/>
+          </a:prstGeom>
+          <a:noFill/>
+          <a:ln w="19050" cap="flat">
+            <a:solidFill>
+              <a:srgbClr val="CFE7F1"/>
+            </a:solidFill>
+            <a:prstDash val="solid"/>
+            <a:miter lim="400000"/>
+            <a:headEnd type="triangle" w="med" len="med"/>
+            <a:tailEnd type="triangle" w="med" len="med"/>
+          </a:ln>
+          <a:effectLst/>
+          <a:sp3d/>
+        </p:spPr>
+        <p:style>
+          <a:lnRef idx="0">
+            <a:scrgbClr r="0" g="0" b="0"/>
+          </a:lnRef>
+          <a:fillRef idx="0">
+            <a:scrgbClr r="0" g="0" b="0"/>
+          </a:fillRef>
+          <a:effectRef idx="0">
+            <a:scrgbClr r="0" g="0" b="0"/>
+          </a:effectRef>
+          <a:fontRef idx="none"/>
+        </p:style>
+      </p:cxnSp>
+      <p:cxnSp>
+        <p:nvCxnSpPr>
+          <p:cNvPr id="34" name="Straight Arrow Connector 33">
+            <a:extLst>
+              <a:ext uri="{FF2B5EF4-FFF2-40B4-BE49-F238E27FC236}">
+                <a16:creationId xmlns:a16="http://schemas.microsoft.com/office/drawing/2014/main" id="{17009850-E346-654C-B3E4-C03BFD4B9171}"/>
+              </a:ext>
+            </a:extLst>
+          </p:cNvPr>
+          <p:cNvCxnSpPr>
+            <a:cxnSpLocks/>
+            <a:stCxn id="31" idx="2"/>
+            <a:endCxn id="27" idx="0"/>
+          </p:cNvCxnSpPr>
+          <p:nvPr/>
+        </p:nvCxnSpPr>
+        <p:spPr>
+          <a:xfrm>
+            <a:off x="1523755" y="2847078"/>
+            <a:ext cx="435777" cy="984104"/>
+          </a:xfrm>
+          <a:prstGeom prst="straightConnector1">
+            <a:avLst/>
+          </a:prstGeom>
+          <a:noFill/>
+          <a:ln w="19050" cap="flat">
+            <a:solidFill>
+              <a:srgbClr val="CFE7F1"/>
+            </a:solidFill>
+            <a:prstDash val="solid"/>
+            <a:miter lim="400000"/>
+            <a:headEnd type="triangle" w="med" len="med"/>
+            <a:tailEnd type="triangle" w="med" len="med"/>
+          </a:ln>
+          <a:effectLst/>
+          <a:sp3d/>
+        </p:spPr>
+        <p:style>
+          <a:lnRef idx="0">
+            <a:scrgbClr r="0" g="0" b="0"/>
+          </a:lnRef>
+          <a:fillRef idx="0">
+            <a:scrgbClr r="0" g="0" b="0"/>
+          </a:fillRef>
+          <a:effectRef idx="0">
+            <a:scrgbClr r="0" g="0" b="0"/>
+          </a:effectRef>
+          <a:fontRef idx="none"/>
+        </p:style>
+      </p:cxnSp>
+      <p:cxnSp>
+        <p:nvCxnSpPr>
+          <p:cNvPr id="35" name="Straight Arrow Connector 34">
+            <a:extLst>
+              <a:ext uri="{FF2B5EF4-FFF2-40B4-BE49-F238E27FC236}">
+                <a16:creationId xmlns:a16="http://schemas.microsoft.com/office/drawing/2014/main" id="{11BC14A5-CCB6-D345-81D3-5DEA653396FF}"/>
+              </a:ext>
+            </a:extLst>
+          </p:cNvPr>
+          <p:cNvCxnSpPr>
+            <a:cxnSpLocks/>
+            <a:stCxn id="32" idx="2"/>
+            <a:endCxn id="27" idx="0"/>
+          </p:cNvCxnSpPr>
+          <p:nvPr/>
+        </p:nvCxnSpPr>
+        <p:spPr>
+          <a:xfrm flipH="1">
+            <a:off x="1959532" y="2847078"/>
+            <a:ext cx="936751" cy="984104"/>
+          </a:xfrm>
+          <a:prstGeom prst="straightConnector1">
+            <a:avLst/>
+          </a:prstGeom>
+          <a:noFill/>
+          <a:ln w="19050" cap="flat">
+            <a:solidFill>
+              <a:srgbClr val="CFE7F1"/>
+            </a:solidFill>
+            <a:prstDash val="solid"/>
+            <a:miter lim="400000"/>
+            <a:headEnd type="triangle" w="med" len="med"/>
+            <a:tailEnd type="triangle" w="med" len="med"/>
+          </a:ln>
+          <a:effectLst/>
+          <a:sp3d/>
+        </p:spPr>
+        <p:style>
+          <a:lnRef idx="0">
+            <a:scrgbClr r="0" g="0" b="0"/>
+          </a:lnRef>
+          <a:fillRef idx="0">
+            <a:scrgbClr r="0" g="0" b="0"/>
+          </a:fillRef>
+          <a:effectRef idx="0">
+            <a:scrgbClr r="0" g="0" b="0"/>
+          </a:effectRef>
+          <a:fontRef idx="none"/>
+        </p:style>
+      </p:cxnSp>
+      <p:cxnSp>
+        <p:nvCxnSpPr>
+          <p:cNvPr id="36" name="Straight Arrow Connector 35">
+            <a:extLst>
+              <a:ext uri="{FF2B5EF4-FFF2-40B4-BE49-F238E27FC236}">
+                <a16:creationId xmlns:a16="http://schemas.microsoft.com/office/drawing/2014/main" id="{94727C89-77CC-CD45-86DA-AEC6F6CE1D9C}"/>
+              </a:ext>
+            </a:extLst>
+          </p:cNvPr>
+          <p:cNvCxnSpPr>
+            <a:cxnSpLocks/>
+            <a:stCxn id="30" idx="2"/>
+            <a:endCxn id="27" idx="0"/>
+          </p:cNvCxnSpPr>
+          <p:nvPr/>
+        </p:nvCxnSpPr>
+        <p:spPr>
+          <a:xfrm flipH="1">
+            <a:off x="1959532" y="3465402"/>
+            <a:ext cx="1370061" cy="365780"/>
+          </a:xfrm>
+          <a:prstGeom prst="straightConnector1">
+            <a:avLst/>
+          </a:prstGeom>
+          <a:noFill/>
+          <a:ln w="19050" cap="flat">
+            <a:solidFill>
+              <a:srgbClr val="CFE7F1"/>
+            </a:solidFill>
+            <a:prstDash val="solid"/>
+            <a:miter lim="400000"/>
+            <a:headEnd type="triangle" w="med" len="med"/>
+            <a:tailEnd type="triangle" w="med" len="med"/>
+          </a:ln>
+          <a:effectLst/>
+          <a:sp3d/>
+        </p:spPr>
+        <p:style>
+          <a:lnRef idx="0">
+            <a:scrgbClr r="0" g="0" b="0"/>
+          </a:lnRef>
+          <a:fillRef idx="0">
+            <a:scrgbClr r="0" g="0" b="0"/>
+          </a:fillRef>
+          <a:effectRef idx="0">
+            <a:scrgbClr r="0" g="0" b="0"/>
+          </a:effectRef>
+          <a:fontRef idx="none"/>
+        </p:style>
+      </p:cxnSp>
+      <p:cxnSp>
+        <p:nvCxnSpPr>
+          <p:cNvPr id="39" name="Straight Arrow Connector 38">
+            <a:extLst>
+              <a:ext uri="{FF2B5EF4-FFF2-40B4-BE49-F238E27FC236}">
+                <a16:creationId xmlns:a16="http://schemas.microsoft.com/office/drawing/2014/main" id="{F9A8BA84-C0E5-2545-8D3A-9E3A0B1898EA}"/>
+              </a:ext>
+            </a:extLst>
+          </p:cNvPr>
+          <p:cNvCxnSpPr>
+            <a:cxnSpLocks/>
+          </p:cNvCxnSpPr>
+          <p:nvPr/>
+        </p:nvCxnSpPr>
+        <p:spPr>
+          <a:xfrm flipH="1">
+            <a:off x="5193324" y="3026191"/>
+            <a:ext cx="720527" cy="0"/>
+          </a:xfrm>
+          <a:prstGeom prst="straightConnector1">
+            <a:avLst/>
+          </a:prstGeom>
+          <a:noFill/>
+          <a:ln w="25400" cap="flat">
+            <a:solidFill>
+              <a:srgbClr val="0070C0"/>
+            </a:solidFill>
+            <a:prstDash val="solid"/>
+            <a:miter lim="400000"/>
+            <a:headEnd type="triangle" w="med" len="med"/>
+            <a:tailEnd type="triangle" w="med" len="med"/>
+          </a:ln>
+          <a:effectLst/>
+          <a:sp3d/>
+        </p:spPr>
+        <p:style>
+          <a:lnRef idx="0">
+            <a:scrgbClr r="0" g="0" b="0"/>
+          </a:lnRef>
+          <a:fillRef idx="0">
+            <a:scrgbClr r="0" g="0" b="0"/>
+          </a:fillRef>
+          <a:effectRef idx="0">
+            <a:scrgbClr r="0" g="0" b="0"/>
+          </a:effectRef>
+          <a:fontRef idx="none"/>
+        </p:style>
+      </p:cxnSp>
+      <p:sp>
+        <p:nvSpPr>
+          <p:cNvPr id="41" name="TextBox 40">
+            <a:extLst>
+              <a:ext uri="{FF2B5EF4-FFF2-40B4-BE49-F238E27FC236}">
+                <a16:creationId xmlns:a16="http://schemas.microsoft.com/office/drawing/2014/main" id="{CD0B250D-20D1-5C40-ABF5-67F24F1416F5}"/>
               </a:ext>
             </a:extLst>
           </p:cNvPr>
@@ -8909,8 +8466,8 @@
         </p:nvSpPr>
         <p:spPr>
           <a:xfrm>
-            <a:off x="661041" y="4590401"/>
-            <a:ext cx="1821012" cy="379591"/>
+            <a:off x="5279466" y="2669982"/>
+            <a:ext cx="525785" cy="348813"/>
           </a:xfrm>
           <a:prstGeom prst="rect">
             <a:avLst/>
@@ -8958,6 +8515,192 @@
               <a:tabLst/>
             </a:pPr>
             <a:r>
+              <a:rPr kumimoji="0" lang="en-AU" sz="1600" b="0" i="0" u="none" strike="noStrike" cap="none" spc="0" normalizeH="0" baseline="0" dirty="0" err="1">
+                <a:ln>
+                  <a:noFill/>
+                </a:ln>
+                <a:effectLst/>
+                <a:uFillTx/>
+                <a:ea typeface="Palatino"/>
+                <a:cs typeface="Palatino"/>
+                <a:sym typeface="Palatino"/>
+              </a:rPr>
+              <a:t>gRPC</a:t>
+            </a:r>
+            <a:endParaRPr kumimoji="0" lang="en-AU" sz="1600" b="0" i="0" u="none" strike="noStrike" cap="none" spc="0" normalizeH="0" baseline="0" dirty="0">
+              <a:ln>
+                <a:noFill/>
+              </a:ln>
+              <a:effectLst/>
+              <a:uFillTx/>
+              <a:ea typeface="Palatino"/>
+              <a:cs typeface="Palatino"/>
+              <a:sym typeface="Palatino"/>
+            </a:endParaRPr>
+          </a:p>
+        </p:txBody>
+      </p:sp>
+      <p:cxnSp>
+        <p:nvCxnSpPr>
+          <p:cNvPr id="43" name="Straight Connector 42">
+            <a:extLst>
+              <a:ext uri="{FF2B5EF4-FFF2-40B4-BE49-F238E27FC236}">
+                <a16:creationId xmlns:a16="http://schemas.microsoft.com/office/drawing/2014/main" id="{449EBDA5-D575-2D42-B08A-79BA8AD71BAE}"/>
+              </a:ext>
+            </a:extLst>
+          </p:cNvPr>
+          <p:cNvCxnSpPr>
+            <a:cxnSpLocks/>
+          </p:cNvCxnSpPr>
+          <p:nvPr/>
+        </p:nvCxnSpPr>
+        <p:spPr>
+          <a:xfrm>
+            <a:off x="5913850" y="4160350"/>
+            <a:ext cx="5574766" cy="0"/>
+          </a:xfrm>
+          <a:prstGeom prst="line">
+            <a:avLst/>
+          </a:prstGeom>
+          <a:noFill/>
+          <a:ln w="25400" cap="flat">
+            <a:solidFill>
+              <a:schemeClr val="tx1"/>
+            </a:solidFill>
+            <a:prstDash val="sysDash"/>
+            <a:miter lim="400000"/>
+          </a:ln>
+          <a:effectLst/>
+          <a:sp3d/>
+        </p:spPr>
+        <p:style>
+          <a:lnRef idx="0">
+            <a:scrgbClr r="0" g="0" b="0"/>
+          </a:lnRef>
+          <a:fillRef idx="0">
+            <a:scrgbClr r="0" g="0" b="0"/>
+          </a:fillRef>
+          <a:effectRef idx="0">
+            <a:scrgbClr r="0" g="0" b="0"/>
+          </a:effectRef>
+          <a:fontRef idx="none"/>
+        </p:style>
+      </p:cxnSp>
+      <p:cxnSp>
+        <p:nvCxnSpPr>
+          <p:cNvPr id="46" name="Elbow Connector 45">
+            <a:extLst>
+              <a:ext uri="{FF2B5EF4-FFF2-40B4-BE49-F238E27FC236}">
+                <a16:creationId xmlns:a16="http://schemas.microsoft.com/office/drawing/2014/main" id="{99ADD232-BED8-2B43-9ED3-D72253227423}"/>
+              </a:ext>
+            </a:extLst>
+          </p:cNvPr>
+          <p:cNvCxnSpPr>
+            <a:cxnSpLocks/>
+            <a:stCxn id="58" idx="3"/>
+            <a:endCxn id="16" idx="1"/>
+          </p:cNvCxnSpPr>
+          <p:nvPr/>
+        </p:nvCxnSpPr>
+        <p:spPr>
+          <a:xfrm flipV="1">
+            <a:off x="3206259" y="4461142"/>
+            <a:ext cx="4320701" cy="1277624"/>
+          </a:xfrm>
+          <a:prstGeom prst="bentConnector3">
+            <a:avLst>
+              <a:gd name="adj1" fmla="val 9844"/>
+            </a:avLst>
+          </a:prstGeom>
+          <a:noFill/>
+          <a:ln w="28575" cap="flat">
+            <a:solidFill>
+              <a:srgbClr val="414141"/>
+            </a:solidFill>
+            <a:prstDash val="solid"/>
+            <a:miter lim="400000"/>
+            <a:headEnd type="triangle"/>
+            <a:tailEnd type="triangle"/>
+          </a:ln>
+          <a:effectLst/>
+          <a:sp3d/>
+        </p:spPr>
+        <p:style>
+          <a:lnRef idx="0">
+            <a:scrgbClr r="0" g="0" b="0"/>
+          </a:lnRef>
+          <a:fillRef idx="0">
+            <a:scrgbClr r="0" g="0" b="0"/>
+          </a:fillRef>
+          <a:effectRef idx="0">
+            <a:scrgbClr r="0" g="0" b="0"/>
+          </a:effectRef>
+          <a:fontRef idx="none"/>
+        </p:style>
+      </p:cxnSp>
+      <p:sp>
+        <p:nvSpPr>
+          <p:cNvPr id="52" name="TextBox 51">
+            <a:extLst>
+              <a:ext uri="{FF2B5EF4-FFF2-40B4-BE49-F238E27FC236}">
+                <a16:creationId xmlns:a16="http://schemas.microsoft.com/office/drawing/2014/main" id="{A209E662-FEA2-3C45-AFD5-D66289D2DC8F}"/>
+              </a:ext>
+            </a:extLst>
+          </p:cNvPr>
+          <p:cNvSpPr txBox="1"/>
+          <p:nvPr/>
+        </p:nvSpPr>
+        <p:spPr>
+          <a:xfrm>
+            <a:off x="1009103" y="1778884"/>
+            <a:ext cx="2436564" cy="379591"/>
+          </a:xfrm>
+          <a:prstGeom prst="rect">
+            <a:avLst/>
+          </a:prstGeom>
+          <a:noFill/>
+          <a:ln w="12700" cap="flat">
+            <a:noFill/>
+            <a:miter lim="400000"/>
+          </a:ln>
+          <a:effectLst/>
+          <a:sp3d/>
+        </p:spPr>
+        <p:style>
+          <a:lnRef idx="0">
+            <a:scrgbClr r="0" g="0" b="0"/>
+          </a:lnRef>
+          <a:fillRef idx="0">
+            <a:scrgbClr r="0" g="0" b="0"/>
+          </a:fillRef>
+          <a:effectRef idx="0">
+            <a:scrgbClr r="0" g="0" b="0"/>
+          </a:effectRef>
+          <a:fontRef idx="none"/>
+        </p:style>
+        <p:txBody>
+          <a:bodyPr rot="0" spcFirstLastPara="1" vertOverflow="overflow" horzOverflow="overflow" vert="horz" wrap="none" lIns="50800" tIns="50800" rIns="50800" bIns="50800" numCol="1" spcCol="38100" rtlCol="0" anchor="ctr">
+            <a:spAutoFit/>
+          </a:bodyPr>
+          <a:lstStyle/>
+          <a:p>
+            <a:pPr marL="0" marR="0" indent="0" algn="ctr" defTabSz="825500" rtl="0" fontAlgn="auto" latinLnBrk="0" hangingPunct="0">
+              <a:lnSpc>
+                <a:spcPct val="100000"/>
+              </a:lnSpc>
+              <a:spcBef>
+                <a:spcPts val="0"/>
+              </a:spcBef>
+              <a:spcAft>
+                <a:spcPts val="0"/>
+              </a:spcAft>
+              <a:buClrTx/>
+              <a:buSzTx/>
+              <a:buFontTx/>
+              <a:buNone/>
+              <a:tabLst/>
+            </a:pPr>
+            <a:r>
               <a:rPr kumimoji="0" lang="en-AU" b="0" i="0" u="none" strike="noStrike" cap="none" spc="0" normalizeH="0" baseline="0" dirty="0">
                 <a:ln>
                   <a:noFill/>
@@ -8971,39 +8714,115 @@
                 <a:cs typeface="Palatino"/>
                 <a:sym typeface="Palatino"/>
               </a:rPr>
-              <a:t>Access Gateway</a:t>
-            </a:r>
-          </a:p>
-        </p:txBody>
-      </p:sp>
-      <p:sp>
-        <p:nvSpPr>
-          <p:cNvPr id="8" name="Rectangle 7">
-            <a:extLst>
-              <a:ext uri="{FF2B5EF4-FFF2-40B4-BE49-F238E27FC236}">
-                <a16:creationId xmlns:a16="http://schemas.microsoft.com/office/drawing/2014/main" id="{4F1C5037-F04A-804B-911A-BE545C8260CA}"/>
-              </a:ext>
-            </a:extLst>
-          </p:cNvPr>
-          <p:cNvSpPr/>
-          <p:nvPr/>
-        </p:nvSpPr>
-        <p:spPr>
-          <a:xfrm>
-            <a:off x="351693" y="1755824"/>
-            <a:ext cx="4982308" cy="2540734"/>
+              <a:t>RAN-specific protocols</a:t>
+            </a:r>
+          </a:p>
+        </p:txBody>
+      </p:sp>
+      <p:sp>
+        <p:nvSpPr>
+          <p:cNvPr id="55" name="TextBox 54">
+            <a:extLst>
+              <a:ext uri="{FF2B5EF4-FFF2-40B4-BE49-F238E27FC236}">
+                <a16:creationId xmlns:a16="http://schemas.microsoft.com/office/drawing/2014/main" id="{9ABC7393-C161-EE43-B5DB-532797048C29}"/>
+              </a:ext>
+            </a:extLst>
+          </p:cNvPr>
+          <p:cNvSpPr txBox="1"/>
+          <p:nvPr/>
+        </p:nvSpPr>
+        <p:spPr>
+          <a:xfrm>
+            <a:off x="8163207" y="1007232"/>
+            <a:ext cx="525785" cy="348813"/>
           </a:xfrm>
           <a:prstGeom prst="rect">
             <a:avLst/>
           </a:prstGeom>
           <a:noFill/>
           <a:ln w="12700" cap="flat">
+            <a:noFill/>
+            <a:miter lim="400000"/>
+          </a:ln>
+          <a:effectLst/>
+          <a:sp3d/>
+        </p:spPr>
+        <p:style>
+          <a:lnRef idx="0">
+            <a:scrgbClr r="0" g="0" b="0"/>
+          </a:lnRef>
+          <a:fillRef idx="0">
+            <a:scrgbClr r="0" g="0" b="0"/>
+          </a:fillRef>
+          <a:effectRef idx="0">
+            <a:scrgbClr r="0" g="0" b="0"/>
+          </a:effectRef>
+          <a:fontRef idx="none"/>
+        </p:style>
+        <p:txBody>
+          <a:bodyPr rot="0" spcFirstLastPara="1" vertOverflow="overflow" horzOverflow="overflow" vert="horz" wrap="none" lIns="50800" tIns="50800" rIns="50800" bIns="50800" numCol="1" spcCol="38100" rtlCol="0" anchor="ctr">
+            <a:spAutoFit/>
+          </a:bodyPr>
+          <a:lstStyle/>
+          <a:p>
+            <a:pPr marL="0" marR="0" indent="0" algn="ctr" defTabSz="825500" rtl="0" fontAlgn="auto" latinLnBrk="0" hangingPunct="0">
+              <a:lnSpc>
+                <a:spcPct val="100000"/>
+              </a:lnSpc>
+              <a:spcBef>
+                <a:spcPts val="0"/>
+              </a:spcBef>
+              <a:spcAft>
+                <a:spcPts val="0"/>
+              </a:spcAft>
+              <a:buClrTx/>
+              <a:buSzTx/>
+              <a:buFontTx/>
+              <a:buNone/>
+              <a:tabLst/>
+            </a:pPr>
+            <a:r>
+              <a:rPr kumimoji="0" lang="en-AU" sz="1600" b="0" i="0" u="none" strike="noStrike" cap="none" spc="0" normalizeH="0" baseline="0" dirty="0">
+                <a:ln>
+                  <a:noFill/>
+                </a:ln>
+                <a:effectLst/>
+                <a:uFillTx/>
+                <a:ea typeface="Palatino"/>
+                <a:cs typeface="Palatino"/>
+                <a:sym typeface="Palatino"/>
+              </a:rPr>
+              <a:t>gRPC</a:t>
+            </a:r>
+          </a:p>
+        </p:txBody>
+      </p:sp>
+      <p:sp>
+        <p:nvSpPr>
+          <p:cNvPr id="37" name="Rectangle 36">
+            <a:extLst>
+              <a:ext uri="{FF2B5EF4-FFF2-40B4-BE49-F238E27FC236}">
+                <a16:creationId xmlns:a16="http://schemas.microsoft.com/office/drawing/2014/main" id="{065FAA50-5668-4A46-9D8A-BBB0B2CBC887}"/>
+              </a:ext>
+            </a:extLst>
+          </p:cNvPr>
+          <p:cNvSpPr/>
+          <p:nvPr/>
+        </p:nvSpPr>
+        <p:spPr>
+          <a:xfrm>
+            <a:off x="35170" y="1380022"/>
+            <a:ext cx="11570675" cy="3611387"/>
+          </a:xfrm>
+          <a:prstGeom prst="rect">
+            <a:avLst/>
+          </a:prstGeom>
+          <a:noFill/>
+          <a:ln w="19050" cap="flat">
             <a:solidFill>
-              <a:schemeClr val="tx1">
-                <a:lumMod val="65000"/>
-                <a:lumOff val="35000"/>
-              </a:schemeClr>
+              <a:schemeClr val="tx1"/>
             </a:solidFill>
+            <a:prstDash val="sysDash"/>
             <a:miter lim="400000"/>
           </a:ln>
           <a:effectLst/>
@@ -9082,6 +8901,84 @@
       </p:sp>
       <p:sp>
         <p:nvSpPr>
+          <p:cNvPr id="38" name="TextBox 37">
+            <a:extLst>
+              <a:ext uri="{FF2B5EF4-FFF2-40B4-BE49-F238E27FC236}">
+                <a16:creationId xmlns:a16="http://schemas.microsoft.com/office/drawing/2014/main" id="{77310EF1-CF17-A544-AD10-E9132F81FE80}"/>
+              </a:ext>
+            </a:extLst>
+          </p:cNvPr>
+          <p:cNvSpPr txBox="1"/>
+          <p:nvPr/>
+        </p:nvSpPr>
+        <p:spPr>
+          <a:xfrm>
+            <a:off x="633281" y="4590401"/>
+            <a:ext cx="1595180" cy="379591"/>
+          </a:xfrm>
+          <a:prstGeom prst="rect">
+            <a:avLst/>
+          </a:prstGeom>
+          <a:noFill/>
+          <a:ln w="12700" cap="flat">
+            <a:noFill/>
+            <a:miter lim="400000"/>
+          </a:ln>
+          <a:effectLst/>
+          <a:sp3d/>
+        </p:spPr>
+        <p:style>
+          <a:lnRef idx="0">
+            <a:scrgbClr r="0" g="0" b="0"/>
+          </a:lnRef>
+          <a:fillRef idx="0">
+            <a:scrgbClr r="0" g="0" b="0"/>
+          </a:fillRef>
+          <a:effectRef idx="0">
+            <a:scrgbClr r="0" g="0" b="0"/>
+          </a:effectRef>
+          <a:fontRef idx="none"/>
+        </p:style>
+        <p:txBody>
+          <a:bodyPr rot="0" spcFirstLastPara="1" vertOverflow="overflow" horzOverflow="overflow" vert="horz" wrap="none" lIns="50800" tIns="50800" rIns="50800" bIns="50800" numCol="1" spcCol="38100" rtlCol="0" anchor="ctr">
+            <a:spAutoFit/>
+          </a:bodyPr>
+          <a:lstStyle/>
+          <a:p>
+            <a:pPr marL="0" marR="0" indent="0" algn="ctr" defTabSz="825500" rtl="0" fontAlgn="auto" latinLnBrk="0" hangingPunct="0">
+              <a:lnSpc>
+                <a:spcPct val="100000"/>
+              </a:lnSpc>
+              <a:spcBef>
+                <a:spcPts val="0"/>
+              </a:spcBef>
+              <a:spcAft>
+                <a:spcPts val="0"/>
+              </a:spcAft>
+              <a:buClrTx/>
+              <a:buSzTx/>
+              <a:buFontTx/>
+              <a:buNone/>
+              <a:tabLst/>
+            </a:pPr>
+            <a:r>
+              <a:rPr kumimoji="0" lang="en-AU" b="0" i="0" u="none" strike="noStrike" cap="none" spc="0" normalizeH="0" baseline="0" dirty="0">
+                <a:ln>
+                  <a:noFill/>
+                </a:ln>
+                <a:effectLst/>
+                <a:uFillTx/>
+                <a:ea typeface="Palatino"/>
+                <a:cs typeface="Palatino"/>
+                <a:sym typeface="Palatino"/>
+              </a:rPr>
+              <a:t>Access Gateway</a:t>
+            </a:r>
+          </a:p>
+        </p:txBody>
+      </p:sp>
+      <p:sp>
+        <p:nvSpPr>
           <p:cNvPr id="42" name="Rectangle 41">
             <a:extLst>
               <a:ext uri="{FF2B5EF4-FFF2-40B4-BE49-F238E27FC236}">
@@ -9094,7 +8991,7 @@
         </p:nvSpPr>
         <p:spPr>
           <a:xfrm flipH="1">
-            <a:off x="3989364" y="5161341"/>
+            <a:off x="3848688" y="5161341"/>
             <a:ext cx="2360636" cy="1506819"/>
           </a:xfrm>
           <a:prstGeom prst="rect">
@@ -9143,7 +9040,6 @@
                 <a:effectLst/>
                 <a:uLnTx/>
                 <a:uFillTx/>
-                <a:latin typeface="+mn-lt"/>
                 <a:ea typeface="+mn-ea"/>
                 <a:cs typeface="+mn-cs"/>
               </a:rPr>
@@ -9162,7 +9058,6 @@
                 <a:effectLst/>
                 <a:uLnTx/>
                 <a:uFillTx/>
-                <a:latin typeface="+mn-lt"/>
                 <a:ea typeface="+mn-ea"/>
                 <a:cs typeface="+mn-cs"/>
               </a:rPr>
@@ -9190,7 +9085,6 @@
               <a:effectLst/>
               <a:uLnTx/>
               <a:uFillTx/>
-              <a:latin typeface="+mn-lt"/>
               <a:ea typeface="+mn-ea"/>
               <a:cs typeface="+mn-cs"/>
             </a:endParaRPr>
@@ -9211,7 +9105,7 @@
         </p:nvSpPr>
         <p:spPr>
           <a:xfrm>
-            <a:off x="4171075" y="5945042"/>
+            <a:off x="4030399" y="5945042"/>
             <a:ext cx="1433631" cy="363220"/>
           </a:xfrm>
           <a:prstGeom prst="roundRect">
@@ -9246,14 +9140,26 @@
           <a:lstStyle/>
           <a:p>
             <a:pPr algn="ctr" defTabSz="412750" hangingPunct="0"/>
-            <a:endParaRPr lang="en-AU" kern="0" dirty="0">
-              <a:solidFill>
-                <a:prstClr val="white"/>
-              </a:solidFill>
-              <a:latin typeface="Arial" panose="020B0604020202020204"/>
-              <a:ea typeface="Palatino"/>
-              <a:sym typeface="Palatino"/>
-            </a:endParaRPr>
+            <a:r>
+              <a:rPr lang="en-AU" kern="0" dirty="0" err="1">
+                <a:solidFill>
+                  <a:prstClr val="white"/>
+                </a:solidFill>
+                <a:ea typeface="Palatino"/>
+                <a:sym typeface="Palatino"/>
+              </a:rPr>
+              <a:t>WiFi</a:t>
+            </a:r>
+            <a:r>
+              <a:rPr lang="en-AU" kern="0" dirty="0">
+                <a:solidFill>
+                  <a:prstClr val="white"/>
+                </a:solidFill>
+                <a:ea typeface="Palatino"/>
+                <a:sym typeface="Palatino"/>
+              </a:rPr>
+              <a:t> AP</a:t>
+            </a:r>
           </a:p>
         </p:txBody>
       </p:sp>
@@ -9271,7 +9177,7 @@
         </p:nvCxnSpPr>
         <p:spPr>
           <a:xfrm>
-            <a:off x="5219478" y="5603287"/>
+            <a:off x="5078802" y="5603287"/>
             <a:ext cx="0" cy="330035"/>
           </a:xfrm>
           <a:prstGeom prst="line">
@@ -9315,7 +9221,7 @@
         </p:nvSpPr>
         <p:spPr>
           <a:xfrm rot="18948116">
-            <a:off x="4914367" y="5398843"/>
+            <a:off x="4773691" y="5398843"/>
             <a:ext cx="605608" cy="594193"/>
           </a:xfrm>
           <a:prstGeom prst="arc">
@@ -9393,7 +9299,7 @@
         </p:nvSpPr>
         <p:spPr>
           <a:xfrm rot="18948116">
-            <a:off x="5006092" y="5487766"/>
+            <a:off x="4865416" y="5487766"/>
             <a:ext cx="426770" cy="416345"/>
           </a:xfrm>
           <a:prstGeom prst="arc">
@@ -9471,7 +9377,7 @@
         </p:nvSpPr>
         <p:spPr>
           <a:xfrm rot="18948116">
-            <a:off x="4824741" y="5305929"/>
+            <a:off x="4684065" y="5305929"/>
             <a:ext cx="772199" cy="752238"/>
           </a:xfrm>
           <a:prstGeom prst="arc">
@@ -9549,7 +9455,7 @@
         </p:nvSpPr>
         <p:spPr>
           <a:xfrm>
-            <a:off x="3877606" y="3792688"/>
+            <a:off x="3736930" y="3792688"/>
             <a:ext cx="1242395" cy="329168"/>
           </a:xfrm>
           <a:prstGeom prst="roundRect">
@@ -9559,12 +9465,7 @@
             <a:srgbClr val="CFE7F1"/>
           </a:solidFill>
           <a:ln w="12700" cap="flat">
-            <a:solidFill>
-              <a:schemeClr val="tx1">
-                <a:lumMod val="50000"/>
-                <a:lumOff val="50000"/>
-              </a:schemeClr>
-            </a:solidFill>
+            <a:noFill/>
             <a:miter lim="400000"/>
           </a:ln>
           <a:effectLst/>
@@ -9591,7 +9492,11 @@
             <a:pPr algn="ctr" defTabSz="412750" hangingPunct="0"/>
             <a:r>
               <a:rPr lang="en-AU" sz="1600" kern="0" dirty="0">
-                <a:latin typeface="Arial" panose="020B0604020202020204"/>
+                <a:solidFill>
+                  <a:schemeClr val="tx2">
+                    <a:lumMod val="10000"/>
+                  </a:schemeClr>
+                </a:solidFill>
                 <a:ea typeface="Palatino"/>
                 <a:sym typeface="Palatino"/>
               </a:rPr>
@@ -9617,16 +9522,16 @@
         </p:nvCxnSpPr>
         <p:spPr>
           <a:xfrm flipH="1">
-            <a:off x="4497474" y="4121856"/>
+            <a:off x="4356798" y="4121856"/>
             <a:ext cx="1330" cy="1823186"/>
           </a:xfrm>
           <a:prstGeom prst="straightConnector1">
             <a:avLst/>
           </a:prstGeom>
           <a:noFill/>
-          <a:ln w="25400" cap="flat">
+          <a:ln w="19050" cap="flat">
             <a:solidFill>
-              <a:schemeClr val="accent1"/>
+              <a:srgbClr val="0070C0"/>
             </a:solidFill>
             <a:prstDash val="solid"/>
             <a:miter lim="400000"/>
@@ -9663,14 +9568,14 @@
         </p:nvCxnSpPr>
         <p:spPr>
           <a:xfrm>
-            <a:off x="4756288" y="4461142"/>
+            <a:off x="4615612" y="4461142"/>
             <a:ext cx="0" cy="1483900"/>
           </a:xfrm>
           <a:prstGeom prst="straightConnector1">
             <a:avLst/>
           </a:prstGeom>
           <a:noFill/>
-          <a:ln w="25400" cap="flat">
+          <a:ln w="28575" cap="flat">
             <a:solidFill>
               <a:srgbClr val="414141"/>
             </a:solidFill>
@@ -9722,7 +9627,7 @@
         </p:blipFill>
         <p:spPr>
           <a:xfrm>
-            <a:off x="724338" y="5356803"/>
+            <a:off x="583662" y="5356803"/>
             <a:ext cx="818408" cy="971681"/>
           </a:xfrm>
           <a:prstGeom prst="rect">
@@ -9730,6 +9635,306 @@
           </a:prstGeom>
         </p:spPr>
       </p:pic>
+      <p:cxnSp>
+        <p:nvCxnSpPr>
+          <p:cNvPr id="6" name="Straight Arrow Connector 5">
+            <a:extLst>
+              <a:ext uri="{FF2B5EF4-FFF2-40B4-BE49-F238E27FC236}">
+                <a16:creationId xmlns:a16="http://schemas.microsoft.com/office/drawing/2014/main" id="{A2E4C0F3-4792-FB12-7261-3F524F7EEA5D}"/>
+              </a:ext>
+            </a:extLst>
+          </p:cNvPr>
+          <p:cNvCxnSpPr>
+            <a:cxnSpLocks/>
+          </p:cNvCxnSpPr>
+          <p:nvPr/>
+        </p:nvCxnSpPr>
+        <p:spPr>
+          <a:xfrm flipH="1">
+            <a:off x="9948707" y="4461142"/>
+            <a:ext cx="2243293" cy="0"/>
+          </a:xfrm>
+          <a:prstGeom prst="straightConnector1">
+            <a:avLst/>
+          </a:prstGeom>
+          <a:noFill/>
+          <a:ln w="25400" cap="flat">
+            <a:solidFill>
+              <a:schemeClr val="tx1"/>
+            </a:solidFill>
+            <a:prstDash val="solid"/>
+            <a:miter lim="400000"/>
+            <a:headEnd type="triangle" w="med" len="med"/>
+            <a:tailEnd type="triangle" w="med" len="med"/>
+          </a:ln>
+          <a:effectLst/>
+          <a:sp3d/>
+        </p:spPr>
+        <p:style>
+          <a:lnRef idx="0">
+            <a:scrgbClr r="0" g="0" b="0"/>
+          </a:lnRef>
+          <a:fillRef idx="0">
+            <a:scrgbClr r="0" g="0" b="0"/>
+          </a:fillRef>
+          <a:effectRef idx="0">
+            <a:scrgbClr r="0" g="0" b="0"/>
+          </a:effectRef>
+          <a:fontRef idx="none"/>
+        </p:style>
+      </p:cxnSp>
+      <p:sp>
+        <p:nvSpPr>
+          <p:cNvPr id="12" name="Rounded Rectangle 11">
+            <a:extLst>
+              <a:ext uri="{FF2B5EF4-FFF2-40B4-BE49-F238E27FC236}">
+                <a16:creationId xmlns:a16="http://schemas.microsoft.com/office/drawing/2014/main" id="{57AB0D52-57B3-FC91-022E-14E12C16CD06}"/>
+              </a:ext>
+            </a:extLst>
+          </p:cNvPr>
+          <p:cNvSpPr/>
+          <p:nvPr/>
+        </p:nvSpPr>
+        <p:spPr>
+          <a:xfrm>
+            <a:off x="10490266" y="400989"/>
+            <a:ext cx="1115579" cy="601583"/>
+          </a:xfrm>
+          <a:prstGeom prst="roundRect">
+            <a:avLst/>
+          </a:prstGeom>
+          <a:solidFill>
+            <a:schemeClr val="bg1"/>
+          </a:solidFill>
+          <a:ln w="28575" cap="flat">
+            <a:solidFill>
+              <a:srgbClr val="5B9BD5"/>
+            </a:solidFill>
+            <a:miter lim="400000"/>
+          </a:ln>
+          <a:effectLst/>
+          <a:sp3d/>
+        </p:spPr>
+        <p:style>
+          <a:lnRef idx="0">
+            <a:scrgbClr r="0" g="0" b="0"/>
+          </a:lnRef>
+          <a:fillRef idx="0">
+            <a:scrgbClr r="0" g="0" b="0"/>
+          </a:fillRef>
+          <a:effectRef idx="0">
+            <a:scrgbClr r="0" g="0" b="0"/>
+          </a:effectRef>
+          <a:fontRef idx="none"/>
+        </p:style>
+        <p:txBody>
+          <a:bodyPr rot="0" spcFirstLastPara="1" vertOverflow="overflow" horzOverflow="overflow" vert="horz" wrap="square" lIns="25400" tIns="25400" rIns="25400" bIns="25400" numCol="1" spcCol="38100" rtlCol="0" anchor="ctr">
+            <a:spAutoFit/>
+          </a:bodyPr>
+          <a:lstStyle/>
+          <a:p>
+            <a:pPr algn="ctr" defTabSz="412750" hangingPunct="0"/>
+            <a:r>
+              <a:rPr lang="en-AU" sz="1600" kern="0" dirty="0">
+                <a:ea typeface="Palatino"/>
+                <a:sym typeface="Palatino"/>
+              </a:rPr>
+              <a:t>Federation</a:t>
+            </a:r>
+          </a:p>
+          <a:p>
+            <a:pPr algn="ctr" defTabSz="412750" hangingPunct="0"/>
+            <a:r>
+              <a:rPr lang="en-AU" sz="1600" kern="0" dirty="0">
+                <a:ea typeface="Palatino"/>
+                <a:sym typeface="Palatino"/>
+              </a:rPr>
+              <a:t>Gateway</a:t>
+            </a:r>
+          </a:p>
+        </p:txBody>
+      </p:sp>
+      <p:cxnSp>
+        <p:nvCxnSpPr>
+          <p:cNvPr id="29" name="Straight Arrow Connector 28">
+            <a:extLst>
+              <a:ext uri="{FF2B5EF4-FFF2-40B4-BE49-F238E27FC236}">
+                <a16:creationId xmlns:a16="http://schemas.microsoft.com/office/drawing/2014/main" id="{E83D689B-66E9-293B-B819-811B5C3EDD7D}"/>
+              </a:ext>
+            </a:extLst>
+          </p:cNvPr>
+          <p:cNvCxnSpPr>
+            <a:cxnSpLocks/>
+            <a:stCxn id="12" idx="1"/>
+            <a:endCxn id="10" idx="3"/>
+          </p:cNvCxnSpPr>
+          <p:nvPr/>
+        </p:nvCxnSpPr>
+        <p:spPr>
+          <a:xfrm flipH="1">
+            <a:off x="10052538" y="701781"/>
+            <a:ext cx="437728" cy="0"/>
+          </a:xfrm>
+          <a:prstGeom prst="straightConnector1">
+            <a:avLst/>
+          </a:prstGeom>
+          <a:noFill/>
+          <a:ln w="19050" cap="flat">
+            <a:solidFill>
+              <a:srgbClr val="0070C0"/>
+            </a:solidFill>
+            <a:prstDash val="solid"/>
+            <a:miter lim="400000"/>
+            <a:headEnd type="triangle" w="med" len="med"/>
+            <a:tailEnd type="triangle" w="med" len="med"/>
+          </a:ln>
+          <a:effectLst/>
+          <a:sp3d/>
+        </p:spPr>
+        <p:style>
+          <a:lnRef idx="0">
+            <a:scrgbClr r="0" g="0" b="0"/>
+          </a:lnRef>
+          <a:fillRef idx="0">
+            <a:scrgbClr r="0" g="0" b="0"/>
+          </a:fillRef>
+          <a:effectRef idx="0">
+            <a:scrgbClr r="0" g="0" b="0"/>
+          </a:effectRef>
+          <a:fontRef idx="none"/>
+        </p:style>
+      </p:cxnSp>
+      <p:cxnSp>
+        <p:nvCxnSpPr>
+          <p:cNvPr id="54" name="Straight Arrow Connector 53">
+            <a:extLst>
+              <a:ext uri="{FF2B5EF4-FFF2-40B4-BE49-F238E27FC236}">
+                <a16:creationId xmlns:a16="http://schemas.microsoft.com/office/drawing/2014/main" id="{015EE97E-D28E-1D13-1476-D53BD78D4FC5}"/>
+              </a:ext>
+            </a:extLst>
+          </p:cNvPr>
+          <p:cNvCxnSpPr>
+            <a:cxnSpLocks/>
+          </p:cNvCxnSpPr>
+          <p:nvPr/>
+        </p:nvCxnSpPr>
+        <p:spPr>
+          <a:xfrm flipH="1">
+            <a:off x="11613596" y="701780"/>
+            <a:ext cx="578404" cy="0"/>
+          </a:xfrm>
+          <a:prstGeom prst="straightConnector1">
+            <a:avLst/>
+          </a:prstGeom>
+          <a:noFill/>
+          <a:ln w="19050" cap="flat">
+            <a:solidFill>
+              <a:srgbClr val="0070C0"/>
+            </a:solidFill>
+            <a:prstDash val="solid"/>
+            <a:miter lim="400000"/>
+            <a:headEnd type="triangle" w="med" len="med"/>
+            <a:tailEnd type="triangle" w="med" len="med"/>
+          </a:ln>
+          <a:effectLst/>
+          <a:sp3d/>
+        </p:spPr>
+        <p:style>
+          <a:lnRef idx="0">
+            <a:scrgbClr r="0" g="0" b="0"/>
+          </a:lnRef>
+          <a:fillRef idx="0">
+            <a:scrgbClr r="0" g="0" b="0"/>
+          </a:fillRef>
+          <a:effectRef idx="0">
+            <a:scrgbClr r="0" g="0" b="0"/>
+          </a:effectRef>
+          <a:fontRef idx="none"/>
+        </p:style>
+      </p:cxnSp>
+      <p:sp>
+        <p:nvSpPr>
+          <p:cNvPr id="61" name="TextBox 60">
+            <a:extLst>
+              <a:ext uri="{FF2B5EF4-FFF2-40B4-BE49-F238E27FC236}">
+                <a16:creationId xmlns:a16="http://schemas.microsoft.com/office/drawing/2014/main" id="{24456033-0967-B59B-E89C-EE7144F7215A}"/>
+              </a:ext>
+            </a:extLst>
+          </p:cNvPr>
+          <p:cNvSpPr txBox="1"/>
+          <p:nvPr/>
+        </p:nvSpPr>
+        <p:spPr>
+          <a:xfrm>
+            <a:off x="11628684" y="693130"/>
+            <a:ext cx="548227" cy="348813"/>
+          </a:xfrm>
+          <a:prstGeom prst="rect">
+            <a:avLst/>
+          </a:prstGeom>
+          <a:noFill/>
+          <a:ln w="12700" cap="flat">
+            <a:noFill/>
+            <a:miter lim="400000"/>
+          </a:ln>
+          <a:effectLst/>
+          <a:sp3d/>
+        </p:spPr>
+        <p:style>
+          <a:lnRef idx="0">
+            <a:scrgbClr r="0" g="0" b="0"/>
+          </a:lnRef>
+          <a:fillRef idx="0">
+            <a:scrgbClr r="0" g="0" b="0"/>
+          </a:fillRef>
+          <a:effectRef idx="0">
+            <a:scrgbClr r="0" g="0" b="0"/>
+          </a:effectRef>
+          <a:fontRef idx="none"/>
+        </p:style>
+        <p:txBody>
+          <a:bodyPr rot="0" spcFirstLastPara="1" vertOverflow="overflow" horzOverflow="overflow" vert="horz" wrap="none" lIns="50800" tIns="50800" rIns="50800" bIns="50800" numCol="1" spcCol="38100" rtlCol="0" anchor="ctr">
+            <a:spAutoFit/>
+          </a:bodyPr>
+          <a:lstStyle/>
+          <a:p>
+            <a:pPr marL="0" marR="0" indent="0" algn="ctr" defTabSz="825500" rtl="0" fontAlgn="auto" latinLnBrk="0" hangingPunct="0">
+              <a:lnSpc>
+                <a:spcPct val="100000"/>
+              </a:lnSpc>
+              <a:spcBef>
+                <a:spcPts val="0"/>
+              </a:spcBef>
+              <a:spcAft>
+                <a:spcPts val="0"/>
+              </a:spcAft>
+              <a:buClrTx/>
+              <a:buSzTx/>
+              <a:buFontTx/>
+              <a:buNone/>
+              <a:tabLst/>
+            </a:pPr>
+            <a:r>
+              <a:rPr lang="en-AU" sz="1600" dirty="0">
+                <a:ea typeface="Palatino"/>
+                <a:cs typeface="Palatino"/>
+                <a:sym typeface="Palatino"/>
+              </a:rPr>
+              <a:t>3GPP</a:t>
+            </a:r>
+            <a:endParaRPr kumimoji="0" lang="en-AU" sz="1600" b="0" i="0" u="none" strike="noStrike" cap="none" spc="0" normalizeH="0" baseline="0" dirty="0">
+              <a:ln>
+                <a:noFill/>
+              </a:ln>
+              <a:effectLst/>
+              <a:uFillTx/>
+              <a:ea typeface="Palatino"/>
+              <a:cs typeface="Palatino"/>
+              <a:sym typeface="Palatino"/>
+            </a:endParaRPr>
+          </a:p>
+        </p:txBody>
+      </p:sp>
     </p:spTree>
     <p:extLst>
       <p:ext uri="{BB962C8B-B14F-4D97-AF65-F5344CB8AC3E}">

</xml_diff>